<commit_message>
Poster updates for formatting and readability
</commit_message>
<xml_diff>
--- a/Poster - updated.pptx
+++ b/Poster - updated.pptx
@@ -244,6 +244,650 @@
     </p:ext>
   </p:extLst>
 </p:presentation>
+</file>
+
+<file path=ppt/changesInfos/changesInfo1.xml><?xml version="1.0" encoding="utf-8"?>
+<pc:chgInfo xmlns:a="http://schemas.openxmlformats.org/drawingml/2006/main" xmlns:r="http://schemas.openxmlformats.org/officeDocument/2006/relationships" xmlns:ac="http://schemas.microsoft.com/office/drawing/2013/main/command" xmlns:pc="http://schemas.microsoft.com/office/powerpoint/2013/main/command">
+  <pc:docChgLst>
+    <pc:chgData name="Alex Kash" userId="f5e23f3ca38d60df" providerId="LiveId" clId="{F02E8239-325E-46EB-9261-F55A7ABF3594}"/>
+    <pc:docChg chg="undo custSel addSld delSld modSld">
+      <pc:chgData name="Alex Kash" userId="f5e23f3ca38d60df" providerId="LiveId" clId="{F02E8239-325E-46EB-9261-F55A7ABF3594}" dt="2025-04-26T13:57:46.181" v="570" actId="6549"/>
+      <pc:docMkLst>
+        <pc:docMk/>
+      </pc:docMkLst>
+      <pc:sldChg chg="addSp delSp modSp mod setBg">
+        <pc:chgData name="Alex Kash" userId="f5e23f3ca38d60df" providerId="LiveId" clId="{F02E8239-325E-46EB-9261-F55A7ABF3594}" dt="2025-04-26T13:57:46.181" v="570" actId="6549"/>
+        <pc:sldMkLst>
+          <pc:docMk/>
+          <pc:sldMk cId="0" sldId="263"/>
+        </pc:sldMkLst>
+        <pc:spChg chg="mod">
+          <ac:chgData name="Alex Kash" userId="f5e23f3ca38d60df" providerId="LiveId" clId="{F02E8239-325E-46EB-9261-F55A7ABF3594}" dt="2025-04-26T12:17:53.353" v="267" actId="403"/>
+          <ac:spMkLst>
+            <pc:docMk/>
+            <pc:sldMk cId="0" sldId="263"/>
+            <ac:spMk id="2" creationId="{F1022784-D4CD-56FF-28C2-499A603346C7}"/>
+          </ac:spMkLst>
+        </pc:spChg>
+        <pc:spChg chg="mod">
+          <ac:chgData name="Alex Kash" userId="f5e23f3ca38d60df" providerId="LiveId" clId="{F02E8239-325E-46EB-9261-F55A7ABF3594}" dt="2025-04-26T13:57:46.181" v="570" actId="6549"/>
+          <ac:spMkLst>
+            <pc:docMk/>
+            <pc:sldMk cId="0" sldId="263"/>
+            <ac:spMk id="3" creationId="{D1813B58-E1F2-19F4-E83E-D495D530CDBD}"/>
+          </ac:spMkLst>
+        </pc:spChg>
+        <pc:spChg chg="mod">
+          <ac:chgData name="Alex Kash" userId="f5e23f3ca38d60df" providerId="LiveId" clId="{F02E8239-325E-46EB-9261-F55A7ABF3594}" dt="2025-04-26T12:12:59.446" v="246" actId="14100"/>
+          <ac:spMkLst>
+            <pc:docMk/>
+            <pc:sldMk cId="0" sldId="263"/>
+            <ac:spMk id="4" creationId="{FD0FD2CF-8F8E-6FC3-F254-B0307EF2CBDA}"/>
+          </ac:spMkLst>
+        </pc:spChg>
+        <pc:spChg chg="mod">
+          <ac:chgData name="Alex Kash" userId="f5e23f3ca38d60df" providerId="LiveId" clId="{F02E8239-325E-46EB-9261-F55A7ABF3594}" dt="2025-04-26T12:21:37.397" v="283" actId="403"/>
+          <ac:spMkLst>
+            <pc:docMk/>
+            <pc:sldMk cId="0" sldId="263"/>
+            <ac:spMk id="5" creationId="{C2AB7E43-03C1-8C40-FE5F-0231C8BFAC6A}"/>
+          </ac:spMkLst>
+        </pc:spChg>
+        <pc:spChg chg="mod">
+          <ac:chgData name="Alex Kash" userId="f5e23f3ca38d60df" providerId="LiveId" clId="{F02E8239-325E-46EB-9261-F55A7ABF3594}" dt="2025-04-26T13:54:18.144" v="557" actId="20577"/>
+          <ac:spMkLst>
+            <pc:docMk/>
+            <pc:sldMk cId="0" sldId="263"/>
+            <ac:spMk id="6" creationId="{43DB4D25-6726-53F2-6601-D828ED226DCE}"/>
+          </ac:spMkLst>
+        </pc:spChg>
+        <pc:spChg chg="add">
+          <ac:chgData name="Alex Kash" userId="f5e23f3ca38d60df" providerId="LiveId" clId="{F02E8239-325E-46EB-9261-F55A7ABF3594}" dt="2025-04-26T11:59:03.047" v="207"/>
+          <ac:spMkLst>
+            <pc:docMk/>
+            <pc:sldMk cId="0" sldId="263"/>
+            <ac:spMk id="7" creationId="{DEC874CB-9E96-BFB9-E3D3-2732EB17F729}"/>
+          </ac:spMkLst>
+        </pc:spChg>
+        <pc:spChg chg="mod">
+          <ac:chgData name="Alex Kash" userId="f5e23f3ca38d60df" providerId="LiveId" clId="{F02E8239-325E-46EB-9261-F55A7ABF3594}" dt="2025-04-26T12:51:27.739" v="452" actId="1076"/>
+          <ac:spMkLst>
+            <pc:docMk/>
+            <pc:sldMk cId="0" sldId="263"/>
+            <ac:spMk id="9" creationId="{465AF586-10E6-048E-C3CC-F12CE1B7020E}"/>
+          </ac:spMkLst>
+        </pc:spChg>
+        <pc:spChg chg="add mod">
+          <ac:chgData name="Alex Kash" userId="f5e23f3ca38d60df" providerId="LiveId" clId="{F02E8239-325E-46EB-9261-F55A7ABF3594}" dt="2025-04-26T11:59:25.281" v="210" actId="20578"/>
+          <ac:spMkLst>
+            <pc:docMk/>
+            <pc:sldMk cId="0" sldId="263"/>
+            <ac:spMk id="10" creationId="{A6CD3A1E-594A-D564-5EC3-759A40E94C7B}"/>
+          </ac:spMkLst>
+        </pc:spChg>
+        <pc:spChg chg="add del mod">
+          <ac:chgData name="Alex Kash" userId="f5e23f3ca38d60df" providerId="LiveId" clId="{F02E8239-325E-46EB-9261-F55A7ABF3594}" dt="2025-04-26T13:29:30.753" v="496"/>
+          <ac:spMkLst>
+            <pc:docMk/>
+            <pc:sldMk cId="0" sldId="263"/>
+            <ac:spMk id="39" creationId="{5B4F6AE5-8EEB-8940-3A5D-BC003F369F7B}"/>
+          </ac:spMkLst>
+        </pc:spChg>
+        <pc:spChg chg="mod">
+          <ac:chgData name="Alex Kash" userId="f5e23f3ca38d60df" providerId="LiveId" clId="{F02E8239-325E-46EB-9261-F55A7ABF3594}" dt="2025-04-26T13:56:03.727" v="560" actId="403"/>
+          <ac:spMkLst>
+            <pc:docMk/>
+            <pc:sldMk cId="0" sldId="263"/>
+            <ac:spMk id="41" creationId="{8785E597-B0C8-4CA8-9A56-A0F3996D088D}"/>
+          </ac:spMkLst>
+        </pc:spChg>
+        <pc:spChg chg="mod">
+          <ac:chgData name="Alex Kash" userId="f5e23f3ca38d60df" providerId="LiveId" clId="{F02E8239-325E-46EB-9261-F55A7ABF3594}" dt="2025-04-26T11:37:48.332" v="199" actId="207"/>
+          <ac:spMkLst>
+            <pc:docMk/>
+            <pc:sldMk cId="0" sldId="263"/>
+            <ac:spMk id="42" creationId="{EBC3B70E-A392-4069-A147-C1FCF37051AF}"/>
+          </ac:spMkLst>
+        </pc:spChg>
+        <pc:spChg chg="mod">
+          <ac:chgData name="Alex Kash" userId="f5e23f3ca38d60df" providerId="LiveId" clId="{F02E8239-325E-46EB-9261-F55A7ABF3594}" dt="2025-04-26T12:12:04.402" v="237" actId="14100"/>
+          <ac:spMkLst>
+            <pc:docMk/>
+            <pc:sldMk cId="0" sldId="263"/>
+            <ac:spMk id="46" creationId="{2C718E78-BDD8-4BAD-851F-D423AE935B0D}"/>
+          </ac:spMkLst>
+        </pc:spChg>
+        <pc:spChg chg="mod">
+          <ac:chgData name="Alex Kash" userId="f5e23f3ca38d60df" providerId="LiveId" clId="{F02E8239-325E-46EB-9261-F55A7ABF3594}" dt="2025-04-26T11:29:45.853" v="174" actId="14100"/>
+          <ac:spMkLst>
+            <pc:docMk/>
+            <pc:sldMk cId="0" sldId="263"/>
+            <ac:spMk id="48" creationId="{3E6D1C9C-2516-4738-BC80-673A19ECE5BD}"/>
+          </ac:spMkLst>
+        </pc:spChg>
+        <pc:spChg chg="mod">
+          <ac:chgData name="Alex Kash" userId="f5e23f3ca38d60df" providerId="LiveId" clId="{F02E8239-325E-46EB-9261-F55A7ABF3594}" dt="2025-04-26T12:12:55.168" v="245" actId="14100"/>
+          <ac:spMkLst>
+            <pc:docMk/>
+            <pc:sldMk cId="0" sldId="263"/>
+            <ac:spMk id="49" creationId="{8F25EFAD-7AAF-4CAF-BA69-869B3D423F7F}"/>
+          </ac:spMkLst>
+        </pc:spChg>
+        <pc:spChg chg="mod">
+          <ac:chgData name="Alex Kash" userId="f5e23f3ca38d60df" providerId="LiveId" clId="{F02E8239-325E-46EB-9261-F55A7ABF3594}" dt="2025-04-26T12:44:35.160" v="384" actId="14100"/>
+          <ac:spMkLst>
+            <pc:docMk/>
+            <pc:sldMk cId="0" sldId="263"/>
+            <ac:spMk id="51" creationId="{75B645A8-44C4-5044-A019-09A63377902D}"/>
+          </ac:spMkLst>
+        </pc:spChg>
+        <pc:spChg chg="mod">
+          <ac:chgData name="Alex Kash" userId="f5e23f3ca38d60df" providerId="LiveId" clId="{F02E8239-325E-46EB-9261-F55A7ABF3594}" dt="2025-04-26T12:52:51.400" v="467" actId="14100"/>
+          <ac:spMkLst>
+            <pc:docMk/>
+            <pc:sldMk cId="0" sldId="263"/>
+            <ac:spMk id="52" creationId="{F6D8A1CF-B987-4F36-8586-4BEDACCCAB04}"/>
+          </ac:spMkLst>
+        </pc:spChg>
+        <pc:spChg chg="mod">
+          <ac:chgData name="Alex Kash" userId="f5e23f3ca38d60df" providerId="LiveId" clId="{F02E8239-325E-46EB-9261-F55A7ABF3594}" dt="2025-04-26T12:12:12.367" v="242" actId="20577"/>
+          <ac:spMkLst>
+            <pc:docMk/>
+            <pc:sldMk cId="0" sldId="263"/>
+            <ac:spMk id="53" creationId="{B9BDD4D7-12C6-4DBA-AD93-2C88BC17BC8B}"/>
+          </ac:spMkLst>
+        </pc:spChg>
+        <pc:spChg chg="mod">
+          <ac:chgData name="Alex Kash" userId="f5e23f3ca38d60df" providerId="LiveId" clId="{F02E8239-325E-46EB-9261-F55A7ABF3594}" dt="2025-04-26T12:17:21.772" v="264" actId="403"/>
+          <ac:spMkLst>
+            <pc:docMk/>
+            <pc:sldMk cId="0" sldId="263"/>
+            <ac:spMk id="54" creationId="{E4864E4E-50A2-403F-84B8-E4F7E820612B}"/>
+          </ac:spMkLst>
+        </pc:spChg>
+        <pc:spChg chg="mod">
+          <ac:chgData name="Alex Kash" userId="f5e23f3ca38d60df" providerId="LiveId" clId="{F02E8239-325E-46EB-9261-F55A7ABF3594}" dt="2025-04-26T12:52:41.445" v="466" actId="14100"/>
+          <ac:spMkLst>
+            <pc:docMk/>
+            <pc:sldMk cId="0" sldId="263"/>
+            <ac:spMk id="55" creationId="{32418A42-DDE0-497E-98DF-5F9BFF98DA6B}"/>
+          </ac:spMkLst>
+        </pc:spChg>
+        <pc:spChg chg="mod">
+          <ac:chgData name="Alex Kash" userId="f5e23f3ca38d60df" providerId="LiveId" clId="{F02E8239-325E-46EB-9261-F55A7ABF3594}" dt="2025-04-26T12:52:00.687" v="458" actId="1076"/>
+          <ac:spMkLst>
+            <pc:docMk/>
+            <pc:sldMk cId="0" sldId="263"/>
+            <ac:spMk id="56" creationId="{1D434DB1-CA03-4AE7-BD42-F2F4837CE20D}"/>
+          </ac:spMkLst>
+        </pc:spChg>
+        <pc:spChg chg="mod">
+          <ac:chgData name="Alex Kash" userId="f5e23f3ca38d60df" providerId="LiveId" clId="{F02E8239-325E-46EB-9261-F55A7ABF3594}" dt="2025-04-26T12:52:38.750" v="465" actId="1076"/>
+          <ac:spMkLst>
+            <pc:docMk/>
+            <pc:sldMk cId="0" sldId="263"/>
+            <ac:spMk id="57" creationId="{992CC346-56CD-4384-BB14-A915BC781C78}"/>
+          </ac:spMkLst>
+        </pc:spChg>
+        <pc:spChg chg="mod">
+          <ac:chgData name="Alex Kash" userId="f5e23f3ca38d60df" providerId="LiveId" clId="{F02E8239-325E-46EB-9261-F55A7ABF3594}" dt="2025-04-26T12:19:32.167" v="271" actId="403"/>
+          <ac:spMkLst>
+            <pc:docMk/>
+            <pc:sldMk cId="0" sldId="263"/>
+            <ac:spMk id="59" creationId="{D07EEF88-ACF9-4467-B180-074FC642245A}"/>
+          </ac:spMkLst>
+        </pc:spChg>
+        <pc:spChg chg="mod">
+          <ac:chgData name="Alex Kash" userId="f5e23f3ca38d60df" providerId="LiveId" clId="{F02E8239-325E-46EB-9261-F55A7ABF3594}" dt="2025-04-26T12:52:35.940" v="464" actId="1076"/>
+          <ac:spMkLst>
+            <pc:docMk/>
+            <pc:sldMk cId="0" sldId="263"/>
+            <ac:spMk id="60" creationId="{22B0201C-B275-4172-AE5F-42B6EA405F41}"/>
+          </ac:spMkLst>
+        </pc:spChg>
+        <pc:spChg chg="mod">
+          <ac:chgData name="Alex Kash" userId="f5e23f3ca38d60df" providerId="LiveId" clId="{F02E8239-325E-46EB-9261-F55A7ABF3594}" dt="2025-04-26T13:03:07.950" v="469" actId="1076"/>
+          <ac:spMkLst>
+            <pc:docMk/>
+            <pc:sldMk cId="0" sldId="263"/>
+            <ac:spMk id="61" creationId="{A6E6C31F-098B-45F7-BEE5-8A51FA70D59F}"/>
+          </ac:spMkLst>
+        </pc:spChg>
+        <pc:spChg chg="add del mod">
+          <ac:chgData name="Alex Kash" userId="f5e23f3ca38d60df" providerId="LiveId" clId="{F02E8239-325E-46EB-9261-F55A7ABF3594}" dt="2025-04-26T12:12:38.740" v="243" actId="1076"/>
+          <ac:spMkLst>
+            <pc:docMk/>
+            <pc:sldMk cId="0" sldId="263"/>
+            <ac:spMk id="62" creationId="{A067F8A1-EE95-4354-8E2F-952A6BBDBFFC}"/>
+          </ac:spMkLst>
+        </pc:spChg>
+        <pc:spChg chg="mod">
+          <ac:chgData name="Alex Kash" userId="f5e23f3ca38d60df" providerId="LiveId" clId="{F02E8239-325E-46EB-9261-F55A7ABF3594}" dt="2025-04-26T12:18:10.232" v="269" actId="403"/>
+          <ac:spMkLst>
+            <pc:docMk/>
+            <pc:sldMk cId="0" sldId="263"/>
+            <ac:spMk id="63" creationId="{92D5F59B-F8CA-463C-871F-D1042309DE00}"/>
+          </ac:spMkLst>
+        </pc:spChg>
+        <pc:spChg chg="mod">
+          <ac:chgData name="Alex Kash" userId="f5e23f3ca38d60df" providerId="LiveId" clId="{F02E8239-325E-46EB-9261-F55A7ABF3594}" dt="2025-04-26T12:45:42.351" v="390" actId="1076"/>
+          <ac:spMkLst>
+            <pc:docMk/>
+            <pc:sldMk cId="0" sldId="263"/>
+            <ac:spMk id="65" creationId="{3EA73395-39E8-B246-BC8B-385F0E754468}"/>
+          </ac:spMkLst>
+        </pc:spChg>
+        <pc:spChg chg="mod">
+          <ac:chgData name="Alex Kash" userId="f5e23f3ca38d60df" providerId="LiveId" clId="{F02E8239-325E-46EB-9261-F55A7ABF3594}" dt="2025-04-26T12:44:29.809" v="383" actId="11530"/>
+          <ac:spMkLst>
+            <pc:docMk/>
+            <pc:sldMk cId="0" sldId="263"/>
+            <ac:spMk id="67" creationId="{B411C4C9-3940-9C4A-BDC6-05D8CDAA0B7A}"/>
+          </ac:spMkLst>
+        </pc:spChg>
+        <pc:spChg chg="mod">
+          <ac:chgData name="Alex Kash" userId="f5e23f3ca38d60df" providerId="LiveId" clId="{F02E8239-325E-46EB-9261-F55A7ABF3594}" dt="2025-04-26T12:44:29.809" v="383" actId="11530"/>
+          <ac:spMkLst>
+            <pc:docMk/>
+            <pc:sldMk cId="0" sldId="263"/>
+            <ac:spMk id="68" creationId="{30D64E40-7700-AE48-92E9-B923ACB3247C}"/>
+          </ac:spMkLst>
+        </pc:spChg>
+        <pc:spChg chg="mod">
+          <ac:chgData name="Alex Kash" userId="f5e23f3ca38d60df" providerId="LiveId" clId="{F02E8239-325E-46EB-9261-F55A7ABF3594}" dt="2025-04-26T12:46:27.255" v="394" actId="1076"/>
+          <ac:spMkLst>
+            <pc:docMk/>
+            <pc:sldMk cId="0" sldId="263"/>
+            <ac:spMk id="69" creationId="{6672E20B-639F-564E-8528-6AC6B85602DB}"/>
+          </ac:spMkLst>
+        </pc:spChg>
+        <pc:spChg chg="mod">
+          <ac:chgData name="Alex Kash" userId="f5e23f3ca38d60df" providerId="LiveId" clId="{F02E8239-325E-46EB-9261-F55A7ABF3594}" dt="2025-04-26T12:46:11.579" v="393" actId="1076"/>
+          <ac:spMkLst>
+            <pc:docMk/>
+            <pc:sldMk cId="0" sldId="263"/>
+            <ac:spMk id="70" creationId="{7CF5947E-21B4-CF4D-AC03-2EFD10EA2EA4}"/>
+          </ac:spMkLst>
+        </pc:spChg>
+        <pc:spChg chg="mod">
+          <ac:chgData name="Alex Kash" userId="f5e23f3ca38d60df" providerId="LiveId" clId="{F02E8239-325E-46EB-9261-F55A7ABF3594}" dt="2025-04-26T12:44:29.809" v="383" actId="11530"/>
+          <ac:spMkLst>
+            <pc:docMk/>
+            <pc:sldMk cId="0" sldId="263"/>
+            <ac:spMk id="71" creationId="{0A5356C8-AE46-6C4A-A225-444533BADDF6}"/>
+          </ac:spMkLst>
+        </pc:spChg>
+        <pc:spChg chg="mod">
+          <ac:chgData name="Alex Kash" userId="f5e23f3ca38d60df" providerId="LiveId" clId="{F02E8239-325E-46EB-9261-F55A7ABF3594}" dt="2025-04-26T12:45:48.226" v="391" actId="1076"/>
+          <ac:spMkLst>
+            <pc:docMk/>
+            <pc:sldMk cId="0" sldId="263"/>
+            <ac:spMk id="72" creationId="{5F3019A5-791E-8E45-97FC-30C29AC2AD57}"/>
+          </ac:spMkLst>
+        </pc:spChg>
+        <pc:spChg chg="mod">
+          <ac:chgData name="Alex Kash" userId="f5e23f3ca38d60df" providerId="LiveId" clId="{F02E8239-325E-46EB-9261-F55A7ABF3594}" dt="2025-04-26T12:44:29.809" v="383" actId="11530"/>
+          <ac:spMkLst>
+            <pc:docMk/>
+            <pc:sldMk cId="0" sldId="263"/>
+            <ac:spMk id="78" creationId="{8B5A4DD5-9FC9-8C40-8C4D-5F3A644D496E}"/>
+          </ac:spMkLst>
+        </pc:spChg>
+        <pc:spChg chg="mod">
+          <ac:chgData name="Alex Kash" userId="f5e23f3ca38d60df" providerId="LiveId" clId="{F02E8239-325E-46EB-9261-F55A7ABF3594}" dt="2025-04-26T12:44:29.809" v="383" actId="11530"/>
+          <ac:spMkLst>
+            <pc:docMk/>
+            <pc:sldMk cId="0" sldId="263"/>
+            <ac:spMk id="79" creationId="{D6F571AE-E901-A240-8233-345D1A07850D}"/>
+          </ac:spMkLst>
+        </pc:spChg>
+        <pc:spChg chg="mod">
+          <ac:chgData name="Alex Kash" userId="f5e23f3ca38d60df" providerId="LiveId" clId="{F02E8239-325E-46EB-9261-F55A7ABF3594}" dt="2025-04-26T12:46:07.183" v="392" actId="1076"/>
+          <ac:spMkLst>
+            <pc:docMk/>
+            <pc:sldMk cId="0" sldId="263"/>
+            <ac:spMk id="81" creationId="{32CC4BE0-8C85-9541-BA27-0A6B0FDEFAF9}"/>
+          </ac:spMkLst>
+        </pc:spChg>
+        <pc:spChg chg="mod">
+          <ac:chgData name="Alex Kash" userId="f5e23f3ca38d60df" providerId="LiveId" clId="{F02E8239-325E-46EB-9261-F55A7ABF3594}" dt="2025-04-26T13:54:13.350" v="551" actId="1036"/>
+          <ac:spMkLst>
+            <pc:docMk/>
+            <pc:sldMk cId="0" sldId="263"/>
+            <ac:spMk id="115" creationId="{2A95C838-F4F5-F14E-BDD1-1589B181DF26}"/>
+          </ac:spMkLst>
+        </pc:spChg>
+        <pc:spChg chg="mod">
+          <ac:chgData name="Alex Kash" userId="f5e23f3ca38d60df" providerId="LiveId" clId="{F02E8239-325E-46EB-9261-F55A7ABF3594}" dt="2025-04-26T13:30:33.528" v="507" actId="1036"/>
+          <ac:spMkLst>
+            <pc:docMk/>
+            <pc:sldMk cId="0" sldId="263"/>
+            <ac:spMk id="116" creationId="{079A1A3D-6249-DC41-9E85-BDAC9083ECFD}"/>
+          </ac:spMkLst>
+        </pc:spChg>
+        <pc:spChg chg="del mod">
+          <ac:chgData name="Alex Kash" userId="f5e23f3ca38d60df" providerId="LiveId" clId="{F02E8239-325E-46EB-9261-F55A7ABF3594}" dt="2025-04-26T12:44:14.779" v="382" actId="478"/>
+          <ac:spMkLst>
+            <pc:docMk/>
+            <pc:sldMk cId="0" sldId="263"/>
+            <ac:spMk id="176" creationId="{6DBE7F66-89A6-204A-B68C-EC527CBCF01A}"/>
+          </ac:spMkLst>
+        </pc:spChg>
+        <pc:spChg chg="mod">
+          <ac:chgData name="Alex Kash" userId="f5e23f3ca38d60df" providerId="LiveId" clId="{F02E8239-325E-46EB-9261-F55A7ABF3594}" dt="2025-04-26T12:44:05.182" v="381" actId="11530"/>
+          <ac:spMkLst>
+            <pc:docMk/>
+            <pc:sldMk cId="0" sldId="263"/>
+            <ac:spMk id="178" creationId="{6CB5854D-D934-694E-9DE9-8BD1B5809FB1}"/>
+          </ac:spMkLst>
+        </pc:spChg>
+        <pc:spChg chg="mod">
+          <ac:chgData name="Alex Kash" userId="f5e23f3ca38d60df" providerId="LiveId" clId="{F02E8239-325E-46EB-9261-F55A7ABF3594}" dt="2025-04-26T12:44:05.182" v="381" actId="11530"/>
+          <ac:spMkLst>
+            <pc:docMk/>
+            <pc:sldMk cId="0" sldId="263"/>
+            <ac:spMk id="180" creationId="{840F4049-C6DA-2E46-813D-C03D6F1772D7}"/>
+          </ac:spMkLst>
+        </pc:spChg>
+        <pc:spChg chg="mod">
+          <ac:chgData name="Alex Kash" userId="f5e23f3ca38d60df" providerId="LiveId" clId="{F02E8239-325E-46EB-9261-F55A7ABF3594}" dt="2025-04-26T12:44:05.182" v="381" actId="11530"/>
+          <ac:spMkLst>
+            <pc:docMk/>
+            <pc:sldMk cId="0" sldId="263"/>
+            <ac:spMk id="181" creationId="{02B56F36-83FA-754E-8625-584F83CDEFC4}"/>
+          </ac:spMkLst>
+        </pc:spChg>
+        <pc:spChg chg="mod">
+          <ac:chgData name="Alex Kash" userId="f5e23f3ca38d60df" providerId="LiveId" clId="{F02E8239-325E-46EB-9261-F55A7ABF3594}" dt="2025-04-26T12:44:05.182" v="381" actId="11530"/>
+          <ac:spMkLst>
+            <pc:docMk/>
+            <pc:sldMk cId="0" sldId="263"/>
+            <ac:spMk id="183" creationId="{B777BAA7-5008-6144-B3FC-0A65FA67D9D0}"/>
+          </ac:spMkLst>
+        </pc:spChg>
+        <pc:spChg chg="mod">
+          <ac:chgData name="Alex Kash" userId="f5e23f3ca38d60df" providerId="LiveId" clId="{F02E8239-325E-46EB-9261-F55A7ABF3594}" dt="2025-04-26T12:21:14.365" v="281" actId="20577"/>
+          <ac:spMkLst>
+            <pc:docMk/>
+            <pc:sldMk cId="0" sldId="263"/>
+            <ac:spMk id="185" creationId="{2C64C603-7E31-4444-A742-4D65AEFCBE9D}"/>
+          </ac:spMkLst>
+        </pc:spChg>
+        <pc:spChg chg="mod">
+          <ac:chgData name="Alex Kash" userId="f5e23f3ca38d60df" providerId="LiveId" clId="{F02E8239-325E-46EB-9261-F55A7ABF3594}" dt="2025-04-26T12:44:05.182" v="381" actId="11530"/>
+          <ac:spMkLst>
+            <pc:docMk/>
+            <pc:sldMk cId="0" sldId="263"/>
+            <ac:spMk id="187" creationId="{7B7DED6D-0B24-7D4A-84FF-760870524D22}"/>
+          </ac:spMkLst>
+        </pc:spChg>
+        <pc:spChg chg="mod">
+          <ac:chgData name="Alex Kash" userId="f5e23f3ca38d60df" providerId="LiveId" clId="{F02E8239-325E-46EB-9261-F55A7ABF3594}" dt="2025-04-26T12:44:05.182" v="381" actId="11530"/>
+          <ac:spMkLst>
+            <pc:docMk/>
+            <pc:sldMk cId="0" sldId="263"/>
+            <ac:spMk id="188" creationId="{FD4628D8-458A-5C47-8820-6E5DD106B639}"/>
+          </ac:spMkLst>
+        </pc:spChg>
+        <pc:spChg chg="mod">
+          <ac:chgData name="Alex Kash" userId="f5e23f3ca38d60df" providerId="LiveId" clId="{F02E8239-325E-46EB-9261-F55A7ABF3594}" dt="2025-04-26T12:46:42.166" v="395" actId="1076"/>
+          <ac:spMkLst>
+            <pc:docMk/>
+            <pc:sldMk cId="0" sldId="263"/>
+            <ac:spMk id="189" creationId="{B1B6D00C-2A92-8442-8EE3-F457C64C02DD}"/>
+          </ac:spMkLst>
+        </pc:spChg>
+        <pc:spChg chg="mod">
+          <ac:chgData name="Alex Kash" userId="f5e23f3ca38d60df" providerId="LiveId" clId="{F02E8239-325E-46EB-9261-F55A7ABF3594}" dt="2025-04-26T12:44:05.182" v="381" actId="11530"/>
+          <ac:spMkLst>
+            <pc:docMk/>
+            <pc:sldMk cId="0" sldId="263"/>
+            <ac:spMk id="190" creationId="{88F2CF5E-3D46-D243-BDF0-0C3D94F5FFFF}"/>
+          </ac:spMkLst>
+        </pc:spChg>
+        <pc:spChg chg="mod">
+          <ac:chgData name="Alex Kash" userId="f5e23f3ca38d60df" providerId="LiveId" clId="{F02E8239-325E-46EB-9261-F55A7ABF3594}" dt="2025-04-26T12:46:48.941" v="396" actId="1076"/>
+          <ac:spMkLst>
+            <pc:docMk/>
+            <pc:sldMk cId="0" sldId="263"/>
+            <ac:spMk id="193" creationId="{658A3E93-647A-6F46-A627-6E2EFA78A41F}"/>
+          </ac:spMkLst>
+        </pc:spChg>
+        <pc:spChg chg="mod">
+          <ac:chgData name="Alex Kash" userId="f5e23f3ca38d60df" providerId="LiveId" clId="{F02E8239-325E-46EB-9261-F55A7ABF3594}" dt="2025-04-26T12:47:04.062" v="397" actId="1076"/>
+          <ac:spMkLst>
+            <pc:docMk/>
+            <pc:sldMk cId="0" sldId="263"/>
+            <ac:spMk id="195" creationId="{02BA80DB-144F-294D-99B2-6E4F8520FE1E}"/>
+          </ac:spMkLst>
+        </pc:spChg>
+        <pc:spChg chg="del mod">
+          <ac:chgData name="Alex Kash" userId="f5e23f3ca38d60df" providerId="LiveId" clId="{F02E8239-325E-46EB-9261-F55A7ABF3594}" dt="2025-04-26T12:51:05.086" v="449"/>
+          <ac:spMkLst>
+            <pc:docMk/>
+            <pc:sldMk cId="0" sldId="263"/>
+            <ac:spMk id="205" creationId="{3C2BB3AC-80EE-6B4C-B50A-BD0C65EA8DB6}"/>
+          </ac:spMkLst>
+        </pc:spChg>
+        <pc:spChg chg="del mod">
+          <ac:chgData name="Alex Kash" userId="f5e23f3ca38d60df" providerId="LiveId" clId="{F02E8239-325E-46EB-9261-F55A7ABF3594}" dt="2025-04-26T12:49:07.381" v="404" actId="478"/>
+          <ac:spMkLst>
+            <pc:docMk/>
+            <pc:sldMk cId="0" sldId="263"/>
+            <ac:spMk id="206" creationId="{732BA83C-EEC1-FE4F-AE0B-7FC61DF238A9}"/>
+          </ac:spMkLst>
+        </pc:spChg>
+        <pc:grpChg chg="mod">
+          <ac:chgData name="Alex Kash" userId="f5e23f3ca38d60df" providerId="LiveId" clId="{F02E8239-325E-46EB-9261-F55A7ABF3594}" dt="2025-04-26T13:54:05.945" v="544" actId="1036"/>
+          <ac:grpSpMkLst>
+            <pc:docMk/>
+            <pc:sldMk cId="0" sldId="263"/>
+            <ac:grpSpMk id="47" creationId="{C849DDD5-2CA9-C144-9C20-C6DBD9F3D5C7}"/>
+          </ac:grpSpMkLst>
+        </pc:grpChg>
+        <pc:grpChg chg="mod">
+          <ac:chgData name="Alex Kash" userId="f5e23f3ca38d60df" providerId="LiveId" clId="{F02E8239-325E-46EB-9261-F55A7ABF3594}" dt="2025-04-26T13:53:49.314" v="538" actId="1036"/>
+          <ac:grpSpMkLst>
+            <pc:docMk/>
+            <pc:sldMk cId="0" sldId="263"/>
+            <ac:grpSpMk id="175" creationId="{7F191001-B7A7-E149-B10E-EFA71B30467C}"/>
+          </ac:grpSpMkLst>
+        </pc:grpChg>
+        <pc:graphicFrameChg chg="add mod modGraphic">
+          <ac:chgData name="Alex Kash" userId="f5e23f3ca38d60df" providerId="LiveId" clId="{F02E8239-325E-46EB-9261-F55A7ABF3594}" dt="2025-04-26T13:57:19.915" v="565" actId="1076"/>
+          <ac:graphicFrameMkLst>
+            <pc:docMk/>
+            <pc:sldMk cId="0" sldId="263"/>
+            <ac:graphicFrameMk id="11" creationId="{1C0C8F34-CB81-AEB7-CE5F-4BCDCDC2160E}"/>
+          </ac:graphicFrameMkLst>
+        </pc:graphicFrameChg>
+        <pc:graphicFrameChg chg="mod modGraphic">
+          <ac:chgData name="Alex Kash" userId="f5e23f3ca38d60df" providerId="LiveId" clId="{F02E8239-325E-46EB-9261-F55A7ABF3594}" dt="2025-04-26T13:57:26.910" v="567" actId="1076"/>
+          <ac:graphicFrameMkLst>
+            <pc:docMk/>
+            <pc:sldMk cId="0" sldId="263"/>
+            <ac:graphicFrameMk id="204" creationId="{D289F893-A4B3-A543-8B72-75DFEADD5A39}"/>
+          </ac:graphicFrameMkLst>
+        </pc:graphicFrameChg>
+        <pc:picChg chg="mod">
+          <ac:chgData name="Alex Kash" userId="f5e23f3ca38d60df" providerId="LiveId" clId="{F02E8239-325E-46EB-9261-F55A7ABF3594}" dt="2025-04-26T12:51:22.249" v="451" actId="1076"/>
+          <ac:picMkLst>
+            <pc:docMk/>
+            <pc:sldMk cId="0" sldId="263"/>
+            <ac:picMk id="8" creationId="{F912BCD1-BF89-2354-82EE-722BD9D22755}"/>
+          </ac:picMkLst>
+        </pc:picChg>
+        <pc:cxnChg chg="mod">
+          <ac:chgData name="Alex Kash" userId="f5e23f3ca38d60df" providerId="LiveId" clId="{F02E8239-325E-46EB-9261-F55A7ABF3594}" dt="2025-04-26T12:45:42.351" v="390" actId="1076"/>
+          <ac:cxnSpMkLst>
+            <pc:docMk/>
+            <pc:sldMk cId="0" sldId="263"/>
+            <ac:cxnSpMk id="66" creationId="{C4816149-80A9-2D40-B47A-AC81D03F29BB}"/>
+          </ac:cxnSpMkLst>
+        </pc:cxnChg>
+        <pc:cxnChg chg="mod">
+          <ac:chgData name="Alex Kash" userId="f5e23f3ca38d60df" providerId="LiveId" clId="{F02E8239-325E-46EB-9261-F55A7ABF3594}" dt="2025-04-26T12:45:48.226" v="391" actId="1076"/>
+          <ac:cxnSpMkLst>
+            <pc:docMk/>
+            <pc:sldMk cId="0" sldId="263"/>
+            <ac:cxnSpMk id="73" creationId="{F8EB04D4-775F-D247-969D-426A4C5836D3}"/>
+          </ac:cxnSpMkLst>
+        </pc:cxnChg>
+        <pc:cxnChg chg="mod">
+          <ac:chgData name="Alex Kash" userId="f5e23f3ca38d60df" providerId="LiveId" clId="{F02E8239-325E-46EB-9261-F55A7ABF3594}" dt="2025-04-26T12:45:48.226" v="391" actId="1076"/>
+          <ac:cxnSpMkLst>
+            <pc:docMk/>
+            <pc:sldMk cId="0" sldId="263"/>
+            <ac:cxnSpMk id="74" creationId="{4B72FF25-E148-AF47-B883-8DC70A3626B6}"/>
+          </ac:cxnSpMkLst>
+        </pc:cxnChg>
+        <pc:cxnChg chg="mod">
+          <ac:chgData name="Alex Kash" userId="f5e23f3ca38d60df" providerId="LiveId" clId="{F02E8239-325E-46EB-9261-F55A7ABF3594}" dt="2025-04-26T12:45:48.226" v="391" actId="1076"/>
+          <ac:cxnSpMkLst>
+            <pc:docMk/>
+            <pc:sldMk cId="0" sldId="263"/>
+            <ac:cxnSpMk id="75" creationId="{71F7E511-8273-4B48-B2C8-A1B44ECB96CF}"/>
+          </ac:cxnSpMkLst>
+        </pc:cxnChg>
+        <pc:cxnChg chg="mod">
+          <ac:chgData name="Alex Kash" userId="f5e23f3ca38d60df" providerId="LiveId" clId="{F02E8239-325E-46EB-9261-F55A7ABF3594}" dt="2025-04-26T12:46:11.579" v="393" actId="1076"/>
+          <ac:cxnSpMkLst>
+            <pc:docMk/>
+            <pc:sldMk cId="0" sldId="263"/>
+            <ac:cxnSpMk id="76" creationId="{426A5941-5036-2143-BC28-4DD2630AFEA0}"/>
+          </ac:cxnSpMkLst>
+        </pc:cxnChg>
+        <pc:cxnChg chg="mod">
+          <ac:chgData name="Alex Kash" userId="f5e23f3ca38d60df" providerId="LiveId" clId="{F02E8239-325E-46EB-9261-F55A7ABF3594}" dt="2025-04-26T12:46:11.579" v="393" actId="1076"/>
+          <ac:cxnSpMkLst>
+            <pc:docMk/>
+            <pc:sldMk cId="0" sldId="263"/>
+            <ac:cxnSpMk id="77" creationId="{DFACB6B0-A46B-CA4F-86AB-03C589841334}"/>
+          </ac:cxnSpMkLst>
+        </pc:cxnChg>
+        <pc:cxnChg chg="mod">
+          <ac:chgData name="Alex Kash" userId="f5e23f3ca38d60df" providerId="LiveId" clId="{F02E8239-325E-46EB-9261-F55A7ABF3594}" dt="2025-04-26T12:46:27.255" v="394" actId="1076"/>
+          <ac:cxnSpMkLst>
+            <pc:docMk/>
+            <pc:sldMk cId="0" sldId="263"/>
+            <ac:cxnSpMk id="82" creationId="{5BDACA1C-5B05-B64B-B214-2978173FAC51}"/>
+          </ac:cxnSpMkLst>
+        </pc:cxnChg>
+        <pc:cxnChg chg="mod">
+          <ac:chgData name="Alex Kash" userId="f5e23f3ca38d60df" providerId="LiveId" clId="{F02E8239-325E-46EB-9261-F55A7ABF3594}" dt="2025-04-26T12:46:07.183" v="392" actId="1076"/>
+          <ac:cxnSpMkLst>
+            <pc:docMk/>
+            <pc:sldMk cId="0" sldId="263"/>
+            <ac:cxnSpMk id="83" creationId="{D7DF66A2-D46F-D244-8652-589116468047}"/>
+          </ac:cxnSpMkLst>
+        </pc:cxnChg>
+        <pc:cxnChg chg="mod">
+          <ac:chgData name="Alex Kash" userId="f5e23f3ca38d60df" providerId="LiveId" clId="{F02E8239-325E-46EB-9261-F55A7ABF3594}" dt="2025-04-26T12:47:04.062" v="397" actId="1076"/>
+          <ac:cxnSpMkLst>
+            <pc:docMk/>
+            <pc:sldMk cId="0" sldId="263"/>
+            <ac:cxnSpMk id="182" creationId="{1D5EFDEB-B366-8443-9AD6-07B9BF5F5C97}"/>
+          </ac:cxnSpMkLst>
+        </pc:cxnChg>
+        <pc:cxnChg chg="mod">
+          <ac:chgData name="Alex Kash" userId="f5e23f3ca38d60df" providerId="LiveId" clId="{F02E8239-325E-46EB-9261-F55A7ABF3594}" dt="2025-04-26T12:46:48.941" v="396" actId="1076"/>
+          <ac:cxnSpMkLst>
+            <pc:docMk/>
+            <pc:sldMk cId="0" sldId="263"/>
+            <ac:cxnSpMk id="194" creationId="{132C57E0-83AB-3949-BF8F-C52DBAE11B72}"/>
+          </ac:cxnSpMkLst>
+        </pc:cxnChg>
+        <pc:cxnChg chg="mod">
+          <ac:chgData name="Alex Kash" userId="f5e23f3ca38d60df" providerId="LiveId" clId="{F02E8239-325E-46EB-9261-F55A7ABF3594}" dt="2025-04-26T12:46:42.166" v="395" actId="1076"/>
+          <ac:cxnSpMkLst>
+            <pc:docMk/>
+            <pc:sldMk cId="0" sldId="263"/>
+            <ac:cxnSpMk id="196" creationId="{4B3D5A75-C5FC-FF47-B45A-927DA51BF261}"/>
+          </ac:cxnSpMkLst>
+        </pc:cxnChg>
+        <pc:cxnChg chg="mod">
+          <ac:chgData name="Alex Kash" userId="f5e23f3ca38d60df" providerId="LiveId" clId="{F02E8239-325E-46EB-9261-F55A7ABF3594}" dt="2025-04-26T12:46:48.941" v="396" actId="1076"/>
+          <ac:cxnSpMkLst>
+            <pc:docMk/>
+            <pc:sldMk cId="0" sldId="263"/>
+            <ac:cxnSpMk id="197" creationId="{FFED028F-F8FF-7846-B2C7-A3A17CA4A064}"/>
+          </ac:cxnSpMkLst>
+        </pc:cxnChg>
+        <pc:cxnChg chg="mod">
+          <ac:chgData name="Alex Kash" userId="f5e23f3ca38d60df" providerId="LiveId" clId="{F02E8239-325E-46EB-9261-F55A7ABF3594}" dt="2025-04-26T12:46:42.166" v="395" actId="1076"/>
+          <ac:cxnSpMkLst>
+            <pc:docMk/>
+            <pc:sldMk cId="0" sldId="263"/>
+            <ac:cxnSpMk id="198" creationId="{817D2C17-84F1-EA47-893E-3E8DD1E30F4F}"/>
+          </ac:cxnSpMkLst>
+        </pc:cxnChg>
+        <pc:cxnChg chg="mod">
+          <ac:chgData name="Alex Kash" userId="f5e23f3ca38d60df" providerId="LiveId" clId="{F02E8239-325E-46EB-9261-F55A7ABF3594}" dt="2025-04-26T12:46:42.166" v="395" actId="1076"/>
+          <ac:cxnSpMkLst>
+            <pc:docMk/>
+            <pc:sldMk cId="0" sldId="263"/>
+            <ac:cxnSpMk id="199" creationId="{32DFA753-85A0-C842-8540-FA607BE74C2E}"/>
+          </ac:cxnSpMkLst>
+        </pc:cxnChg>
+        <pc:cxnChg chg="mod">
+          <ac:chgData name="Alex Kash" userId="f5e23f3ca38d60df" providerId="LiveId" clId="{F02E8239-325E-46EB-9261-F55A7ABF3594}" dt="2025-04-26T12:47:04.062" v="397" actId="1076"/>
+          <ac:cxnSpMkLst>
+            <pc:docMk/>
+            <pc:sldMk cId="0" sldId="263"/>
+            <ac:cxnSpMk id="200" creationId="{F00DF144-51D3-404D-845F-580458BD2AD9}"/>
+          </ac:cxnSpMkLst>
+        </pc:cxnChg>
+      </pc:sldChg>
+      <pc:sldChg chg="addSp delSp modSp new del mod">
+        <pc:chgData name="Alex Kash" userId="f5e23f3ca38d60df" providerId="LiveId" clId="{F02E8239-325E-46EB-9261-F55A7ABF3594}" dt="2025-04-26T13:54:32.174" v="558" actId="2696"/>
+        <pc:sldMkLst>
+          <pc:docMk/>
+          <pc:sldMk cId="1579243732" sldId="264"/>
+        </pc:sldMkLst>
+        <pc:spChg chg="add mod">
+          <ac:chgData name="Alex Kash" userId="f5e23f3ca38d60df" providerId="LiveId" clId="{F02E8239-325E-46EB-9261-F55A7ABF3594}" dt="2025-04-26T11:55:20.819" v="205"/>
+          <ac:spMkLst>
+            <pc:docMk/>
+            <pc:sldMk cId="1579243732" sldId="264"/>
+            <ac:spMk id="2" creationId="{5A9F504E-6147-54A6-3A17-3BC90F3F83B4}"/>
+          </ac:spMkLst>
+        </pc:spChg>
+        <pc:spChg chg="add mod">
+          <ac:chgData name="Alex Kash" userId="f5e23f3ca38d60df" providerId="LiveId" clId="{F02E8239-325E-46EB-9261-F55A7ABF3594}" dt="2025-04-26T12:07:39.468" v="223"/>
+          <ac:spMkLst>
+            <pc:docMk/>
+            <pc:sldMk cId="1579243732" sldId="264"/>
+            <ac:spMk id="3" creationId="{569D137F-D614-BE4E-939A-601624E8FE4E}"/>
+          </ac:spMkLst>
+        </pc:spChg>
+        <pc:spChg chg="add mod">
+          <ac:chgData name="Alex Kash" userId="f5e23f3ca38d60df" providerId="LiveId" clId="{F02E8239-325E-46EB-9261-F55A7ABF3594}" dt="2025-04-26T12:15:01.733" v="248"/>
+          <ac:spMkLst>
+            <pc:docMk/>
+            <pc:sldMk cId="1579243732" sldId="264"/>
+            <ac:spMk id="4" creationId="{15473A2F-2494-E15A-9CF5-D7F5ED5F9B76}"/>
+          </ac:spMkLst>
+        </pc:spChg>
+        <pc:graphicFrameChg chg="add del mod modGraphic">
+          <ac:chgData name="Alex Kash" userId="f5e23f3ca38d60df" providerId="LiveId" clId="{F02E8239-325E-46EB-9261-F55A7ABF3594}" dt="2025-04-26T12:33:14.491" v="351" actId="478"/>
+          <ac:graphicFrameMkLst>
+            <pc:docMk/>
+            <pc:sldMk cId="1579243732" sldId="264"/>
+            <ac:graphicFrameMk id="5" creationId="{2F88A7D6-85B9-F667-4243-8C64194850DE}"/>
+          </ac:graphicFrameMkLst>
+        </pc:graphicFrameChg>
+        <pc:graphicFrameChg chg="add mod modGraphic">
+          <ac:chgData name="Alex Kash" userId="f5e23f3ca38d60df" providerId="LiveId" clId="{F02E8239-325E-46EB-9261-F55A7ABF3594}" dt="2025-04-26T12:30:25.199" v="336" actId="255"/>
+          <ac:graphicFrameMkLst>
+            <pc:docMk/>
+            <pc:sldMk cId="1579243732" sldId="264"/>
+            <ac:graphicFrameMk id="6" creationId="{07E719EC-CDAB-003F-2454-DDBBCBE3E9A3}"/>
+          </ac:graphicFrameMkLst>
+        </pc:graphicFrameChg>
+      </pc:sldChg>
+    </pc:docChg>
+  </pc:docChgLst>
+</pc:chgInfo>
 </file>
 
 <file path=ppt/handoutMasters/handoutMaster1.xml><?xml version="1.0" encoding="utf-8"?>
@@ -5074,17 +5718,9 @@
   <p:cSld>
     <p:bg>
       <p:bgPr>
-        <a:gradFill rotWithShape="0">
-          <a:gsLst>
-            <a:gs pos="0">
-              <a:srgbClr val="FFFFFF"/>
-            </a:gs>
-            <a:gs pos="100000">
-              <a:srgbClr val="1482A5"/>
-            </a:gs>
-          </a:gsLst>
-          <a:lin ang="5400000" scaled="1"/>
-        </a:gradFill>
+        <a:solidFill>
+          <a:srgbClr val="B4D7E2"/>
+        </a:solidFill>
         <a:effectLst/>
       </p:bgPr>
     </p:bg>
@@ -5116,8 +5752,8 @@
         </p:nvSpPr>
         <p:spPr>
           <a:xfrm>
-            <a:off x="786063" y="25292481"/>
-            <a:ext cx="15216870" cy="17836717"/>
+            <a:off x="786063" y="21157159"/>
+            <a:ext cx="15216870" cy="21972040"/>
           </a:xfrm>
           <a:prstGeom prst="rect">
             <a:avLst/>
@@ -5202,7 +5838,7 @@
           </a:lstStyle>
           <a:p>
             <a:r>
-              <a:rPr lang="en-US" sz="6400" dirty="0">
+              <a:rPr lang="en-US" sz="7200" b="1" dirty="0">
                 <a:solidFill>
                   <a:srgbClr val="235078"/>
                 </a:solidFill>
@@ -5405,26 +6041,26 @@
           <a:p>
             <a:pPr algn="ctr"/>
             <a:r>
-              <a:rPr lang="en-US" sz="4200" dirty="0">
+              <a:rPr lang="en-US" sz="4200" b="1" dirty="0">
                 <a:solidFill>
-                  <a:srgbClr val="1482A5"/>
+                  <a:schemeClr val="bg1"/>
                 </a:solidFill>
                 <a:latin typeface="Montserrat Light" panose="00000400000000000000" pitchFamily="50" charset="0"/>
               </a:rPr>
               <a:t>Eddie McGowan &amp; Alex </a:t>
             </a:r>
             <a:r>
-              <a:rPr lang="en-US" sz="4200" dirty="0" err="1">
+              <a:rPr lang="en-US" sz="4200" b="1" dirty="0" err="1">
                 <a:solidFill>
-                  <a:srgbClr val="1482A5"/>
+                  <a:schemeClr val="bg1"/>
                 </a:solidFill>
                 <a:latin typeface="Montserrat Light" panose="00000400000000000000" pitchFamily="50" charset="0"/>
               </a:rPr>
               <a:t>Kash</a:t>
             </a:r>
-            <a:endParaRPr lang="en-US" sz="4200" dirty="0">
+            <a:endParaRPr lang="en-US" sz="4200" b="1" dirty="0">
               <a:solidFill>
-                <a:srgbClr val="1482A5"/>
+                <a:schemeClr val="bg1"/>
               </a:solidFill>
               <a:latin typeface="Montserrat Light" panose="00000400000000000000" pitchFamily="50" charset="0"/>
             </a:endParaRPr>
@@ -5432,9 +6068,9 @@
           <a:p>
             <a:pPr algn="ctr"/>
             <a:r>
-              <a:rPr lang="en-US" sz="4200" dirty="0">
+              <a:rPr lang="en-US" sz="4200" b="1" dirty="0">
                 <a:solidFill>
-                  <a:srgbClr val="1482A5"/>
+                  <a:schemeClr val="bg1"/>
                 </a:solidFill>
                 <a:latin typeface="Montserrat Light" panose="00000400000000000000" pitchFamily="50" charset="0"/>
               </a:rPr>
@@ -5457,8 +6093,8 @@
         </p:nvSpPr>
         <p:spPr>
           <a:xfrm>
-            <a:off x="762000" y="4488750"/>
-            <a:ext cx="15216870" cy="10957837"/>
+            <a:off x="778237" y="4575301"/>
+            <a:ext cx="15216870" cy="9350226"/>
           </a:xfrm>
           <a:prstGeom prst="rect">
             <a:avLst/>
@@ -5495,7 +6131,7 @@
           </a:lstStyle>
           <a:p>
             <a:pPr algn="ctr"/>
-            <a:endParaRPr lang="en-US" sz="7200">
+            <a:endParaRPr lang="en-US" sz="7200" dirty="0">
               <a:latin typeface="+mj-lt"/>
             </a:endParaRPr>
           </a:p>
@@ -5516,7 +6152,7 @@
         <p:spPr>
           <a:xfrm>
             <a:off x="16939530" y="4574801"/>
-            <a:ext cx="15216870" cy="16866277"/>
+            <a:ext cx="15216870" cy="17529291"/>
           </a:xfrm>
           <a:prstGeom prst="rect">
             <a:avLst/>
@@ -5571,8 +6207,8 @@
         </p:nvSpPr>
         <p:spPr>
           <a:xfrm>
-            <a:off x="762000" y="16888467"/>
-            <a:ext cx="15216870" cy="6962134"/>
+            <a:off x="762000" y="14813485"/>
+            <a:ext cx="15216870" cy="5455716"/>
           </a:xfrm>
           <a:prstGeom prst="rect">
             <a:avLst/>
@@ -5628,7 +6264,7 @@
         <p:spPr>
           <a:xfrm>
             <a:off x="16939530" y="22894002"/>
-            <a:ext cx="15216870" cy="16944989"/>
+            <a:ext cx="15216870" cy="17627308"/>
           </a:xfrm>
           <a:prstGeom prst="rect">
             <a:avLst/>
@@ -5683,8 +6319,8 @@
         </p:nvSpPr>
         <p:spPr>
           <a:xfrm>
-            <a:off x="1107838" y="5824049"/>
-            <a:ext cx="14525194" cy="9140964"/>
+            <a:off x="1072200" y="5887044"/>
+            <a:ext cx="14525194" cy="7848302"/>
           </a:xfrm>
           <a:prstGeom prst="rect">
             <a:avLst/>
@@ -5701,137 +6337,85 @@
             </a:defPPr>
           </a:lstStyle>
           <a:p>
-            <a:r>
-              <a:rPr lang="en-US" sz="2800" dirty="0"/>
-              <a:t>This project introduces an AI-powered system that streamlines the creation of course modules by transforming teacher-provided resources such as PDFs, articles, and web links into structured, engaging lesson plans. Unlike commercial tools that rely solely on internal content, our solution empowers educators to guide the AI using their own materials and preferred formats.</a:t>
-            </a:r>
-          </a:p>
-          <a:p>
-            <a:endParaRPr lang="en-US" sz="2800" dirty="0"/>
-          </a:p>
-          <a:p>
-            <a:r>
-              <a:rPr lang="en-US" sz="2800" dirty="0"/>
-              <a:t>The system integrates advanced text, image, and table extraction techniques (using </a:t>
-            </a:r>
-            <a:r>
-              <a:rPr lang="en-US" sz="2800" dirty="0" err="1"/>
-              <a:t>PyMuPDF</a:t>
-            </a:r>
-            <a:r>
-              <a:rPr lang="en-US" sz="2800" dirty="0"/>
-              <a:t>, </a:t>
-            </a:r>
-            <a:r>
-              <a:rPr lang="en-US" sz="2800" dirty="0" err="1"/>
-              <a:t>BeautifulSoup</a:t>
-            </a:r>
-            <a:r>
-              <a:rPr lang="en-US" sz="2800" dirty="0"/>
-              <a:t>, </a:t>
-            </a:r>
-            <a:r>
-              <a:rPr lang="en-US" sz="2800" dirty="0" err="1"/>
-              <a:t>PDFPlumber</a:t>
-            </a:r>
-            <a:r>
-              <a:rPr lang="en-US" sz="2800" dirty="0"/>
-              <a:t>, and Pillow) with a multimodal large language model (</a:t>
-            </a:r>
-            <a:r>
-              <a:rPr lang="en-US" sz="2800" dirty="0" err="1"/>
-              <a:t>LLaVA</a:t>
-            </a:r>
-            <a:r>
-              <a:rPr lang="en-US" sz="2800" dirty="0"/>
-              <a:t>) to generate coherent, media-rich lessons. A user-friendly interface enables educators to review, approve, or refine content interactively. Finalized modules are published to a dynamic website, enabling real-time updates and student access.</a:t>
-            </a:r>
-          </a:p>
-          <a:p>
-            <a:endParaRPr lang="en-US" sz="2800" dirty="0"/>
-          </a:p>
-          <a:p>
-            <a:r>
-              <a:rPr lang="en-US" sz="2800" dirty="0"/>
-              <a:t>By supporting multimedia inputs and delivering outputs directly to the web, this solution reduces lesson planning time while enhancing personalization and instructional quality. This tool is designed with educators in mind, promoting greater control over AI-driven content and fostering deeper student engagement.</a:t>
-            </a:r>
-          </a:p>
-          <a:p>
-            <a:endParaRPr lang="en-US" sz="2800" dirty="0"/>
-          </a:p>
-          <a:p>
-            <a:r>
-              <a:rPr lang="en-US" sz="2800" b="1" dirty="0">
-                <a:ea typeface="Open Sans" panose="020B0606030504020204" pitchFamily="34" charset="0"/>
-                <a:cs typeface="Open Sans" panose="020B0606030504020204" pitchFamily="34" charset="0"/>
-              </a:rPr>
+            <a:pPr>
+              <a:buNone/>
+            </a:pPr>
+            <a:r>
+              <a:rPr lang="en-US" sz="3600" dirty="0"/>
+              <a:t>This project presents an AI system that transforms teacher-provided resources—like PDFs, articles, and web links—into structured, engaging lesson plans. Unlike commercial tools, it gives educators full control over inputs and output formats.</a:t>
+            </a:r>
+          </a:p>
+          <a:p>
+            <a:pPr>
+              <a:buNone/>
+            </a:pPr>
+            <a:endParaRPr lang="en-US" sz="3600" dirty="0"/>
+          </a:p>
+          <a:p>
+            <a:pPr>
+              <a:buNone/>
+            </a:pPr>
+            <a:r>
+              <a:rPr lang="en-US" sz="3600" b="1" dirty="0"/>
               <a:t>Key Features:</a:t>
             </a:r>
-          </a:p>
-          <a:p>
-            <a:pPr marL="285750" indent="-285750">
+            <a:endParaRPr lang="en-US" sz="3600" dirty="0"/>
+          </a:p>
+          <a:p>
+            <a:pPr marL="571500" indent="-571500">
               <a:buFont typeface="Arial" panose="020B0604020202020204" pitchFamily="34" charset="0"/>
               <a:buChar char="•"/>
             </a:pPr>
             <a:r>
-              <a:rPr lang="en-US" sz="2800" dirty="0">
-                <a:ea typeface="Open Sans" panose="020B0606030504020204" pitchFamily="34" charset="0"/>
-                <a:cs typeface="Open Sans" panose="020B0606030504020204" pitchFamily="34" charset="0"/>
-              </a:rPr>
+              <a:rPr lang="en-US" sz="3600" dirty="0"/>
               <a:t>Accepts multimedia inputs (text, images, tables)</a:t>
             </a:r>
           </a:p>
           <a:p>
-            <a:pPr marL="285750" indent="-285750">
+            <a:pPr marL="571500" indent="-571500">
               <a:buFont typeface="Arial" panose="020B0604020202020204" pitchFamily="34" charset="0"/>
               <a:buChar char="•"/>
             </a:pPr>
             <a:r>
-              <a:rPr lang="en-US" sz="2800" dirty="0">
-                <a:ea typeface="Open Sans" panose="020B0606030504020204" pitchFamily="34" charset="0"/>
-                <a:cs typeface="Open Sans" panose="020B0606030504020204" pitchFamily="34" charset="0"/>
-              </a:rPr>
+              <a:rPr lang="en-US" sz="3600" dirty="0"/>
               <a:t>Editable prompt interface for teachers</a:t>
             </a:r>
           </a:p>
           <a:p>
-            <a:pPr marL="285750" indent="-285750">
+            <a:pPr marL="571500" indent="-571500">
               <a:buFont typeface="Arial" panose="020B0604020202020204" pitchFamily="34" charset="0"/>
               <a:buChar char="•"/>
             </a:pPr>
             <a:r>
-              <a:rPr lang="en-US" sz="2800" dirty="0">
-                <a:ea typeface="Open Sans" panose="020B0606030504020204" pitchFamily="34" charset="0"/>
-                <a:cs typeface="Open Sans" panose="020B0606030504020204" pitchFamily="34" charset="0"/>
-              </a:rPr>
+              <a:rPr lang="en-US" sz="3600" dirty="0"/>
               <a:t>“</a:t>
             </a:r>
             <a:r>
-              <a:rPr lang="en-US" sz="2800" dirty="0" err="1">
-                <a:ea typeface="Open Sans" panose="020B0606030504020204" pitchFamily="34" charset="0"/>
-                <a:cs typeface="Open Sans" panose="020B0606030504020204" pitchFamily="34" charset="0"/>
-              </a:rPr>
+              <a:rPr lang="en-US" sz="3600" dirty="0" err="1"/>
               <a:t>Reprompt</a:t>
             </a:r>
             <a:r>
-              <a:rPr lang="en-US" sz="2800" dirty="0">
-                <a:ea typeface="Open Sans" panose="020B0606030504020204" pitchFamily="34" charset="0"/>
-                <a:cs typeface="Open Sans" panose="020B0606030504020204" pitchFamily="34" charset="0"/>
-              </a:rPr>
-              <a:t>”/“Approve” workflow for lesson refinement</a:t>
-            </a:r>
-          </a:p>
-          <a:p>
-            <a:pPr marL="285750" indent="-285750">
+              <a:rPr lang="en-US" sz="3600" dirty="0"/>
+              <a:t>”/“Approve” workflow for refining lessons</a:t>
+            </a:r>
+          </a:p>
+          <a:p>
+            <a:pPr marL="571500" indent="-571500">
               <a:buFont typeface="Arial" panose="020B0604020202020204" pitchFamily="34" charset="0"/>
               <a:buChar char="•"/>
             </a:pPr>
             <a:r>
-              <a:rPr lang="en-US" sz="2800" dirty="0">
-                <a:ea typeface="Open Sans" panose="020B0606030504020204" pitchFamily="34" charset="0"/>
-                <a:cs typeface="Open Sans" panose="020B0606030504020204" pitchFamily="34" charset="0"/>
-              </a:rPr>
+              <a:rPr lang="en-US" sz="3600" dirty="0"/>
               <a:t>Automatic website deployment for student access</a:t>
+            </a:r>
+          </a:p>
+          <a:p>
+            <a:endParaRPr lang="en-US" sz="3600" dirty="0"/>
+          </a:p>
+          <a:p>
+            <a:r>
+              <a:rPr lang="en-US" sz="3600" dirty="0"/>
+              <a:t>By supporting diverse inputs and publishing lessons directly to the web, this tool saves time, boosts personalization, and enhances instructional quality—all while keeping teachers in control.</a:t>
             </a:r>
           </a:p>
         </p:txBody>
@@ -5851,7 +6435,7 @@
         <p:spPr>
           <a:xfrm>
             <a:off x="1107838" y="4840069"/>
-            <a:ext cx="14525194" cy="646331"/>
+            <a:ext cx="14525194" cy="830997"/>
           </a:xfrm>
           <a:prstGeom prst="rect">
             <a:avLst/>
@@ -5869,7 +6453,7 @@
           </a:lstStyle>
           <a:p>
             <a:r>
-              <a:rPr lang="en-US" sz="3600" dirty="0">
+              <a:rPr lang="en-US" sz="4800" b="1" dirty="0">
                 <a:solidFill>
                   <a:srgbClr val="235078"/>
                 </a:solidFill>
@@ -5894,8 +6478,8 @@
         </p:nvSpPr>
         <p:spPr>
           <a:xfrm>
-            <a:off x="16852874" y="40628901"/>
-            <a:ext cx="15216870" cy="2458005"/>
+            <a:off x="16852874" y="41213202"/>
+            <a:ext cx="15216870" cy="1873703"/>
           </a:xfrm>
           <a:prstGeom prst="rect">
             <a:avLst/>
@@ -5950,7 +6534,7 @@
         </p:nvSpPr>
         <p:spPr>
           <a:xfrm>
-            <a:off x="17198712" y="41710841"/>
+            <a:off x="17106871" y="42093334"/>
             <a:ext cx="14525194" cy="830997"/>
           </a:xfrm>
           <a:prstGeom prst="rect">
@@ -5970,7 +6554,7 @@
           <a:p>
             <a:r>
               <a:rPr lang="en-US" dirty="0">
-                <a:latin typeface="Montserrat Light" panose="00000400000000000000" pitchFamily="50" charset="0"/>
+                <a:latin typeface="+mj-lt"/>
                 <a:ea typeface="Open Sans" panose="020B0606030504020204" pitchFamily="34" charset="0"/>
                 <a:cs typeface="Open Sans" panose="020B0606030504020204" pitchFamily="34" charset="0"/>
               </a:rPr>
@@ -5978,14 +6562,14 @@
             </a:r>
             <a:r>
               <a:rPr lang="en-US" dirty="0" err="1">
-                <a:latin typeface="Montserrat Light" panose="00000400000000000000" pitchFamily="50" charset="0"/>
+                <a:latin typeface="+mj-lt"/>
                 <a:ea typeface="Open Sans" panose="020B0606030504020204" pitchFamily="34" charset="0"/>
                 <a:cs typeface="Open Sans" panose="020B0606030504020204" pitchFamily="34" charset="0"/>
               </a:rPr>
               <a:t>Yari</a:t>
             </a:r>
             <a:endParaRPr lang="en-US" dirty="0">
-              <a:latin typeface="Montserrat Light" panose="00000400000000000000" pitchFamily="50" charset="0"/>
+              <a:latin typeface="+mj-lt"/>
               <a:ea typeface="Open Sans" panose="020B0606030504020204" pitchFamily="34" charset="0"/>
               <a:cs typeface="Open Sans" panose="020B0606030504020204" pitchFamily="34" charset="0"/>
             </a:endParaRPr>
@@ -5993,7 +6577,7 @@
           <a:p>
             <a:r>
               <a:rPr lang="en-US" dirty="0">
-                <a:latin typeface="Montserrat Light" panose="00000400000000000000" pitchFamily="50" charset="0"/>
+                <a:latin typeface="+mj-lt"/>
                 <a:ea typeface="Open Sans" panose="020B0606030504020204" pitchFamily="34" charset="0"/>
                 <a:cs typeface="Open Sans" panose="020B0606030504020204" pitchFamily="34" charset="0"/>
               </a:rPr>
@@ -6016,7 +6600,7 @@
         </p:nvSpPr>
         <p:spPr>
           <a:xfrm>
-            <a:off x="17198712" y="41105597"/>
+            <a:off x="17015551" y="41436749"/>
             <a:ext cx="14525194" cy="646331"/>
           </a:xfrm>
           <a:prstGeom prst="rect">
@@ -6035,7 +6619,7 @@
           </a:lstStyle>
           <a:p>
             <a:r>
-              <a:rPr lang="en-US" sz="3600" dirty="0">
+              <a:rPr lang="en-US" sz="3600" b="1" dirty="0">
                 <a:solidFill>
                   <a:srgbClr val="235078"/>
                 </a:solidFill>
@@ -6043,6 +6627,12 @@
               </a:rPr>
               <a:t>Acknowledgements</a:t>
             </a:r>
+            <a:endParaRPr lang="en-US" sz="2800" b="1" dirty="0">
+              <a:solidFill>
+                <a:srgbClr val="235078"/>
+              </a:solidFill>
+              <a:latin typeface="Libre Baskerville" panose="02000000000000000000" pitchFamily="2" charset="0"/>
+            </a:endParaRPr>
           </a:p>
         </p:txBody>
       </p:sp>
@@ -6061,7 +6651,7 @@
         <p:spPr>
           <a:xfrm>
             <a:off x="17285368" y="4840069"/>
-            <a:ext cx="14525194" cy="646331"/>
+            <a:ext cx="14525194" cy="830997"/>
           </a:xfrm>
           <a:prstGeom prst="rect">
             <a:avLst/>
@@ -6079,7 +6669,7 @@
           </a:lstStyle>
           <a:p>
             <a:r>
-              <a:rPr lang="en-US" sz="3600" dirty="0">
+              <a:rPr lang="en-US" sz="4800" b="1" dirty="0">
                 <a:solidFill>
                   <a:srgbClr val="235078"/>
                 </a:solidFill>
@@ -6104,8 +6694,8 @@
         </p:nvSpPr>
         <p:spPr>
           <a:xfrm>
-            <a:off x="17355456" y="33904582"/>
-            <a:ext cx="14525194" cy="1384995"/>
+            <a:off x="17140009" y="33738019"/>
+            <a:ext cx="14525194" cy="6740307"/>
           </a:xfrm>
           <a:prstGeom prst="rect">
             <a:avLst/>
@@ -6123,8 +6713,70 @@
           </a:lstStyle>
           <a:p>
             <a:r>
-              <a:rPr lang="en-US" sz="2800" dirty="0"/>
+              <a:rPr lang="en-US" sz="3600" dirty="0"/>
               <a:t>This tool empowers educators with a fast, flexible lesson planning workflow. It supports multimodal materials and reduces iteration cycles by incorporating teacher feedback in real-time. Students benefit from more personalized and engaging learning modules.</a:t>
+            </a:r>
+          </a:p>
+          <a:p>
+            <a:endParaRPr lang="en-US" sz="3600" dirty="0"/>
+          </a:p>
+          <a:p>
+            <a:r>
+              <a:rPr lang="en-US" sz="3600" b="1" dirty="0"/>
+              <a:t>Future World:</a:t>
+            </a:r>
+          </a:p>
+          <a:p>
+            <a:pPr marL="514350" indent="-514350">
+              <a:buAutoNum type="arabicPeriod"/>
+            </a:pPr>
+            <a:r>
+              <a:rPr lang="en-US" sz="3600" dirty="0"/>
+              <a:t>Link with educational platform (e.g., Lehigh Course Site)</a:t>
+            </a:r>
+          </a:p>
+          <a:p>
+            <a:pPr marL="514350" indent="-514350">
+              <a:buAutoNum type="arabicPeriod"/>
+            </a:pPr>
+            <a:r>
+              <a:rPr lang="en-US" sz="3600" dirty="0"/>
+              <a:t>Deploy on cloud infrastructure for scalability</a:t>
+            </a:r>
+          </a:p>
+          <a:p>
+            <a:pPr marL="514350" indent="-514350">
+              <a:buAutoNum type="arabicPeriod"/>
+            </a:pPr>
+            <a:r>
+              <a:rPr lang="en-US" sz="3600" dirty="0"/>
+              <a:t>Change the backend model to </a:t>
+            </a:r>
+            <a:r>
+              <a:rPr lang="en-US" sz="3600" dirty="0" err="1"/>
+              <a:t>LLaVA</a:t>
+            </a:r>
+            <a:r>
+              <a:rPr lang="en-US" sz="3600" dirty="0"/>
+              <a:t> 1.6 to support image inputs</a:t>
+            </a:r>
+          </a:p>
+          <a:p>
+            <a:pPr marL="514350" indent="-514350">
+              <a:buAutoNum type="arabicPeriod"/>
+            </a:pPr>
+            <a:r>
+              <a:rPr lang="en-US" sz="3600" dirty="0"/>
+              <a:t>Accept video inputs</a:t>
+            </a:r>
+          </a:p>
+          <a:p>
+            <a:pPr marL="514350" indent="-514350">
+              <a:buAutoNum type="arabicPeriod"/>
+            </a:pPr>
+            <a:r>
+              <a:rPr lang="en-US" sz="3600" dirty="0"/>
+              <a:t>Preload state and national educational requirements to ensure lesson plans meet educational benchmarks</a:t>
             </a:r>
           </a:p>
         </p:txBody>
@@ -6143,8 +6795,8 @@
         </p:nvSpPr>
         <p:spPr>
           <a:xfrm>
-            <a:off x="17355456" y="33299337"/>
-            <a:ext cx="14525194" cy="646331"/>
+            <a:off x="17162707" y="32781642"/>
+            <a:ext cx="14525194" cy="830997"/>
           </a:xfrm>
           <a:prstGeom prst="rect">
             <a:avLst/>
@@ -6162,7 +6814,7 @@
           </a:lstStyle>
           <a:p>
             <a:r>
-              <a:rPr lang="en-US" sz="3600" dirty="0">
+              <a:rPr lang="en-US" sz="4800" b="1" dirty="0">
                 <a:solidFill>
                   <a:srgbClr val="235078"/>
                 </a:solidFill>
@@ -6170,6 +6822,12 @@
               </a:rPr>
               <a:t>Conclusion</a:t>
             </a:r>
+            <a:endParaRPr lang="en-US" sz="4000" b="1" dirty="0">
+              <a:solidFill>
+                <a:srgbClr val="235078"/>
+              </a:solidFill>
+              <a:latin typeface="Libre Baskerville" panose="02000000000000000000" pitchFamily="2" charset="0"/>
+            </a:endParaRPr>
           </a:p>
         </p:txBody>
       </p:sp>
@@ -6187,8 +6845,8 @@
         </p:nvSpPr>
         <p:spPr>
           <a:xfrm>
-            <a:off x="1032279" y="18617042"/>
-            <a:ext cx="14525194" cy="4401205"/>
+            <a:off x="987522" y="16526731"/>
+            <a:ext cx="14525194" cy="3416320"/>
           </a:xfrm>
           <a:prstGeom prst="rect">
             <a:avLst/>
@@ -6205,55 +6863,51 @@
             </a:defPPr>
           </a:lstStyle>
           <a:p>
-            <a:r>
-              <a:rPr lang="en-US" sz="2800" dirty="0">
-                <a:ea typeface="Open Sans" panose="020B0606030504020204" pitchFamily="34" charset="0"/>
-                <a:cs typeface="Open Sans" panose="020B0606030504020204" pitchFamily="34" charset="0"/>
+            <a:pPr marL="457200" lvl="0" indent="-457200">
+              <a:buFont typeface="Arial" panose="020B0604020202020204" pitchFamily="34" charset="0"/>
+              <a:buChar char="•"/>
+            </a:pPr>
+            <a:r>
+              <a:rPr lang="en-US" altLang="en-US" sz="3600" dirty="0">
+                <a:latin typeface="+mj-lt"/>
               </a:rPr>
-              <a:t>Lesson planning is a time-consuming task, especially when educators aim to tailor instruction to specific learning goals or student needs. While commercial AI tools exist, they rarely allow teachers to control inputs or personalize content. This project builds a solution that empowers educators to generate structured course modules using their own resources.</a:t>
-            </a:r>
-          </a:p>
-          <a:p>
-            <a:endParaRPr lang="en-US" sz="2800" dirty="0">
-              <a:ea typeface="Open Sans" panose="020B0606030504020204" pitchFamily="34" charset="0"/>
-              <a:cs typeface="Open Sans" panose="020B0606030504020204" pitchFamily="34" charset="0"/>
-            </a:endParaRPr>
-          </a:p>
-          <a:p>
-            <a:r>
-              <a:rPr lang="en-US" sz="2800" dirty="0">
-                <a:ea typeface="Open Sans" panose="020B0606030504020204" pitchFamily="34" charset="0"/>
-                <a:cs typeface="Open Sans" panose="020B0606030504020204" pitchFamily="34" charset="0"/>
+              <a:t>Lesson planning is time-consuming, especially when customizing for goals or student needs.</a:t>
+            </a:r>
+          </a:p>
+          <a:p>
+            <a:pPr marL="457200" lvl="0" indent="-457200">
+              <a:buFont typeface="Arial" panose="020B0604020202020204" pitchFamily="34" charset="0"/>
+              <a:buChar char="•"/>
+            </a:pPr>
+            <a:r>
+              <a:rPr lang="en-US" altLang="en-US" sz="3600" dirty="0">
+                <a:latin typeface="+mj-lt"/>
               </a:rPr>
-              <a:t>Our solution system allows teachers to upload PDFs, articles, and web links, and automatically transforms them into structured lessons. The system integrates a multimodal AI model (</a:t>
-            </a:r>
-            <a:r>
-              <a:rPr lang="en-US" sz="2800" dirty="0" err="1">
-                <a:ea typeface="Open Sans" panose="020B0606030504020204" pitchFamily="34" charset="0"/>
-                <a:cs typeface="Open Sans" panose="020B0606030504020204" pitchFamily="34" charset="0"/>
+              <a:t>Commercial AI tools often limit input control and personalization.</a:t>
+            </a:r>
+          </a:p>
+          <a:p>
+            <a:pPr marL="457200" lvl="0" indent="-457200">
+              <a:buFont typeface="Arial" panose="020B0604020202020204" pitchFamily="34" charset="0"/>
+              <a:buChar char="•"/>
+            </a:pPr>
+            <a:r>
+              <a:rPr lang="en-US" altLang="en-US" sz="3600" dirty="0">
+                <a:latin typeface="+mj-lt"/>
               </a:rPr>
-              <a:t>LLaMA</a:t>
-            </a:r>
-            <a:r>
-              <a:rPr lang="en-US" sz="2800" dirty="0">
-                <a:ea typeface="Open Sans" panose="020B0606030504020204" pitchFamily="34" charset="0"/>
-                <a:cs typeface="Open Sans" panose="020B0606030504020204" pitchFamily="34" charset="0"/>
+              <a:t>Educators need a flexible solution to create modules from their own resources.</a:t>
+            </a:r>
+          </a:p>
+          <a:p>
+            <a:pPr marL="457200" lvl="0" indent="-457200">
+              <a:buFont typeface="Arial" panose="020B0604020202020204" pitchFamily="34" charset="0"/>
+              <a:buChar char="•"/>
+            </a:pPr>
+            <a:r>
+              <a:rPr lang="en-US" altLang="en-US" sz="3600" dirty="0">
+                <a:latin typeface="+mj-lt"/>
               </a:rPr>
-              <a:t>) capable of processing text, and tables. The final output is a media-rich </a:t>
-            </a:r>
-            <a:r>
-              <a:rPr lang="en-US" sz="2800" dirty="0" err="1">
-                <a:ea typeface="Open Sans" panose="020B0606030504020204" pitchFamily="34" charset="0"/>
-                <a:cs typeface="Open Sans" panose="020B0606030504020204" pitchFamily="34" charset="0"/>
-              </a:rPr>
-              <a:t>Streamlit</a:t>
-            </a:r>
-            <a:r>
-              <a:rPr lang="en-US" sz="2800" dirty="0">
-                <a:ea typeface="Open Sans" panose="020B0606030504020204" pitchFamily="34" charset="0"/>
-                <a:cs typeface="Open Sans" panose="020B0606030504020204" pitchFamily="34" charset="0"/>
-              </a:rPr>
-              <a:t> module that can be published to a custom website and updated based on teacher feedback. If productionized, this model can be integrated with learning management systems such as Course Site or Canvas.</a:t>
+              <a:t>This project builds a tool to empower teacher-driven content generation.</a:t>
             </a:r>
           </a:p>
         </p:txBody>
@@ -6272,8 +6926,8 @@
         </p:nvSpPr>
         <p:spPr>
           <a:xfrm>
-            <a:off x="987522" y="17429589"/>
-            <a:ext cx="14525194" cy="646331"/>
+            <a:off x="987522" y="15285387"/>
+            <a:ext cx="14525194" cy="830997"/>
           </a:xfrm>
           <a:prstGeom prst="rect">
             <a:avLst/>
@@ -6291,7 +6945,7 @@
           </a:lstStyle>
           <a:p>
             <a:r>
-              <a:rPr lang="en-US" sz="3600" dirty="0">
+              <a:rPr lang="en-US" sz="4800" b="1" dirty="0">
                 <a:solidFill>
                   <a:srgbClr val="235078"/>
                 </a:solidFill>
@@ -6299,6 +6953,12 @@
               </a:rPr>
               <a:t>Problem Description &amp; Motivation</a:t>
             </a:r>
+            <a:endParaRPr lang="en-US" sz="4000" b="1" dirty="0">
+              <a:solidFill>
+                <a:srgbClr val="235078"/>
+              </a:solidFill>
+              <a:latin typeface="Libre Baskerville" panose="02000000000000000000" pitchFamily="2" charset="0"/>
+            </a:endParaRPr>
           </a:p>
         </p:txBody>
       </p:sp>
@@ -6316,10 +6976,10 @@
         </p:nvGrpSpPr>
         <p:grpSpPr>
           <a:xfrm>
-            <a:off x="20086843" y="7909373"/>
-            <a:ext cx="11982901" cy="5607699"/>
+            <a:off x="19583400" y="8870301"/>
+            <a:ext cx="11957345" cy="5607699"/>
             <a:chOff x="188777" y="1175488"/>
-            <a:chExt cx="12003223" cy="5121511"/>
+            <a:chExt cx="11977624" cy="5121511"/>
           </a:xfrm>
         </p:grpSpPr>
         <p:sp>
@@ -6337,9 +6997,9 @@
           <p:spPr>
             <a:xfrm>
               <a:off x="404352" y="1245081"/>
-              <a:ext cx="1172498" cy="379474"/>
+              <a:ext cx="1206517" cy="419844"/>
             </a:xfrm>
-            <a:prstGeom prst="rect">
+            <a:prstGeom prst="roundRect">
               <a:avLst/>
             </a:prstGeom>
             <a:noFill/>
@@ -6400,9 +7060,9 @@
           <p:spPr>
             <a:xfrm>
               <a:off x="188777" y="3221776"/>
-              <a:ext cx="2103120" cy="1051560"/>
+              <a:ext cx="2103120" cy="1143427"/>
             </a:xfrm>
-            <a:prstGeom prst="rect">
+            <a:prstGeom prst="roundRect">
               <a:avLst/>
             </a:prstGeom>
             <a:solidFill>
@@ -6474,14 +7134,16 @@
           </p:nvSpPr>
           <p:spPr>
             <a:xfrm>
-              <a:off x="2742450" y="3171296"/>
+              <a:off x="2742450" y="3240720"/>
               <a:ext cx="2103120" cy="1102040"/>
             </a:xfrm>
-            <a:prstGeom prst="rect">
+            <a:prstGeom prst="roundRect">
               <a:avLst/>
             </a:prstGeom>
             <a:solidFill>
-              <a:srgbClr val="0721B3"/>
+              <a:schemeClr val="bg2">
+                <a:lumMod val="25000"/>
+              </a:schemeClr>
             </a:solidFill>
             <a:ln w="12700" cap="flat" cmpd="sng" algn="ctr">
               <a:solidFill>
@@ -6553,8 +7215,8 @@
           </p:nvCxnSpPr>
           <p:spPr>
             <a:xfrm flipV="1">
-              <a:off x="2291897" y="3722316"/>
-              <a:ext cx="450554" cy="25240"/>
+              <a:off x="2291897" y="3791741"/>
+              <a:ext cx="450554" cy="1749"/>
             </a:xfrm>
             <a:prstGeom prst="bentConnector3">
               <a:avLst>
@@ -6590,7 +7252,7 @@
               <a:off x="188777" y="4669178"/>
               <a:ext cx="2103120" cy="1051560"/>
             </a:xfrm>
-            <a:prstGeom prst="rect">
+            <a:prstGeom prst="roundRect">
               <a:avLst/>
             </a:prstGeom>
             <a:solidFill>
@@ -6663,9 +7325,9 @@
           <p:spPr>
             <a:xfrm>
               <a:off x="10205703" y="5124547"/>
-              <a:ext cx="1750558" cy="674622"/>
+              <a:ext cx="1818277" cy="746390"/>
             </a:xfrm>
-            <a:prstGeom prst="rect">
+            <a:prstGeom prst="roundRect">
               <a:avLst/>
             </a:prstGeom>
             <a:noFill/>
@@ -6759,10 +7421,10 @@
           </p:nvSpPr>
           <p:spPr>
             <a:xfrm>
-              <a:off x="10088880" y="3221776"/>
-              <a:ext cx="2103120" cy="1051560"/>
+              <a:off x="10063281" y="3198801"/>
+              <a:ext cx="2103120" cy="1143427"/>
             </a:xfrm>
-            <a:prstGeom prst="rect">
+            <a:prstGeom prst="roundRect">
               <a:avLst/>
             </a:prstGeom>
             <a:solidFill>
@@ -6834,10 +7496,10 @@
           </p:nvSpPr>
           <p:spPr>
             <a:xfrm>
-              <a:off x="7678156" y="4749682"/>
-              <a:ext cx="2103120" cy="1051560"/>
+              <a:off x="7704411" y="4749682"/>
+              <a:ext cx="2103120" cy="1208981"/>
             </a:xfrm>
-            <a:prstGeom prst="rect">
+            <a:prstGeom prst="roundRect">
               <a:avLst/>
             </a:prstGeom>
             <a:solidFill>
@@ -6912,7 +7574,7 @@
               <a:off x="188777" y="1793469"/>
               <a:ext cx="2103120" cy="1051560"/>
             </a:xfrm>
-            <a:prstGeom prst="rect">
+            <a:prstGeom prst="roundRect">
               <a:avLst/>
             </a:prstGeom>
             <a:solidFill>
@@ -6984,14 +7646,16 @@
           </p:nvSpPr>
           <p:spPr>
             <a:xfrm>
-              <a:off x="5245919" y="3221776"/>
+              <a:off x="5232216" y="3269110"/>
               <a:ext cx="2103120" cy="1051560"/>
             </a:xfrm>
-            <a:prstGeom prst="rect">
+            <a:prstGeom prst="roundRect">
               <a:avLst/>
             </a:prstGeom>
             <a:solidFill>
-              <a:srgbClr val="0721B3"/>
+              <a:schemeClr val="bg2">
+                <a:lumMod val="25000"/>
+              </a:schemeClr>
             </a:solidFill>
             <a:ln w="12700" cap="flat" cmpd="sng" algn="ctr">
               <a:solidFill>
@@ -7063,8 +7727,8 @@
           </p:nvCxnSpPr>
           <p:spPr>
             <a:xfrm flipV="1">
-              <a:off x="2291897" y="4273336"/>
-              <a:ext cx="4005582" cy="921622"/>
+              <a:off x="2291897" y="4320670"/>
+              <a:ext cx="3991879" cy="874288"/>
             </a:xfrm>
             <a:prstGeom prst="bentConnector2">
               <a:avLst/>
@@ -7100,7 +7764,7 @@
           <p:spPr>
             <a:xfrm>
               <a:off x="2291897" y="2319249"/>
-              <a:ext cx="4005582" cy="902527"/>
+              <a:ext cx="3991879" cy="949861"/>
             </a:xfrm>
             <a:prstGeom prst="bentConnector2">
               <a:avLst/>
@@ -7135,8 +7799,8 @@
           </p:nvCxnSpPr>
           <p:spPr>
             <a:xfrm>
-              <a:off x="4845570" y="3722316"/>
-              <a:ext cx="400349" cy="25240"/>
+              <a:off x="4845570" y="3791741"/>
+              <a:ext cx="386646" cy="3150"/>
             </a:xfrm>
             <a:prstGeom prst="bentConnector3">
               <a:avLst>
@@ -7172,9 +7836,9 @@
             <p:nvPr/>
           </p:nvCxnSpPr>
           <p:spPr>
-            <a:xfrm rot="16200000" flipH="1">
-              <a:off x="8486164" y="4506130"/>
-              <a:ext cx="476346" cy="10757"/>
+            <a:xfrm rot="5400000">
+              <a:off x="8534150" y="4527858"/>
+              <a:ext cx="443645" cy="1"/>
             </a:xfrm>
             <a:prstGeom prst="bentConnector3">
               <a:avLst>
@@ -7211,8 +7875,8 @@
           </p:nvCxnSpPr>
           <p:spPr>
             <a:xfrm rot="10800000">
-              <a:off x="6297480" y="4273336"/>
-              <a:ext cx="1380677" cy="1002126"/>
+              <a:off x="6283776" y="4320671"/>
+              <a:ext cx="1420635" cy="1033502"/>
             </a:xfrm>
             <a:prstGeom prst="bentConnector2">
               <a:avLst/>
@@ -7244,9 +7908,9 @@
           <p:spPr>
             <a:xfrm>
               <a:off x="5410665" y="1175488"/>
-              <a:ext cx="1936822" cy="379474"/>
+              <a:ext cx="1974285" cy="419844"/>
             </a:xfrm>
-            <a:prstGeom prst="rect">
+            <a:prstGeom prst="roundRect">
               <a:avLst/>
             </a:prstGeom>
             <a:noFill/>
@@ -7307,9 +7971,9 @@
           <p:spPr>
             <a:xfrm>
               <a:off x="10368504" y="1175488"/>
-              <a:ext cx="1308984" cy="379474"/>
+              <a:ext cx="1346962" cy="419844"/>
             </a:xfrm>
-            <a:prstGeom prst="rect">
+            <a:prstGeom prst="roundRect">
               <a:avLst/>
             </a:prstGeom>
             <a:noFill/>
@@ -7369,14 +8033,16 @@
           </p:nvSpPr>
           <p:spPr>
             <a:xfrm>
-              <a:off x="7667399" y="3221776"/>
+              <a:off x="7704412" y="3254476"/>
               <a:ext cx="2103120" cy="1051560"/>
             </a:xfrm>
-            <a:prstGeom prst="rect">
+            <a:prstGeom prst="roundRect">
               <a:avLst/>
             </a:prstGeom>
             <a:solidFill>
-              <a:srgbClr val="0721B3"/>
+              <a:schemeClr val="bg2">
+                <a:lumMod val="25000"/>
+              </a:schemeClr>
             </a:solidFill>
             <a:ln w="12700" cap="flat" cmpd="sng" algn="ctr">
               <a:solidFill>
@@ -7447,9 +8113,9 @@
             <p:nvPr/>
           </p:nvCxnSpPr>
           <p:spPr>
-            <a:xfrm>
-              <a:off x="9770519" y="3747556"/>
-              <a:ext cx="318361" cy="12700"/>
+            <a:xfrm flipV="1">
+              <a:off x="9807531" y="3770515"/>
+              <a:ext cx="255750" cy="9742"/>
             </a:xfrm>
             <a:prstGeom prst="bentConnector3">
               <a:avLst>
@@ -7485,13 +8151,13 @@
             <p:nvPr/>
           </p:nvCxnSpPr>
           <p:spPr>
-            <a:xfrm>
-              <a:off x="7349039" y="3747556"/>
-              <a:ext cx="318360" cy="12700"/>
+            <a:xfrm flipV="1">
+              <a:off x="7335335" y="3780257"/>
+              <a:ext cx="369077" cy="14634"/>
             </a:xfrm>
             <a:prstGeom prst="bentConnector3">
               <a:avLst>
-                <a:gd name="adj1" fmla="val 38032"/>
+                <a:gd name="adj1" fmla="val 50000"/>
               </a:avLst>
             </a:prstGeom>
             <a:noFill/>
@@ -7591,8 +8257,8 @@
         </p:nvSpPr>
         <p:spPr>
           <a:xfrm>
-            <a:off x="17315261" y="10488584"/>
-            <a:ext cx="2403825" cy="523220"/>
+            <a:off x="17315261" y="11469469"/>
+            <a:ext cx="2403825" cy="646331"/>
           </a:xfrm>
           <a:prstGeom prst="rect">
             <a:avLst/>
@@ -7610,7 +8276,7 @@
           </a:lstStyle>
           <a:p>
             <a:r>
-              <a:rPr lang="en-US" sz="2800" b="1" dirty="0">
+              <a:rPr lang="en-US" sz="3600" b="1" dirty="0">
                 <a:latin typeface="+mj-lt"/>
               </a:rPr>
               <a:t>Overall</a:t>
@@ -7632,8 +8298,8 @@
         </p:nvSpPr>
         <p:spPr>
           <a:xfrm>
-            <a:off x="17373787" y="17566257"/>
-            <a:ext cx="2819213" cy="954107"/>
+            <a:off x="17373787" y="18078271"/>
+            <a:ext cx="2819213" cy="1200329"/>
           </a:xfrm>
           <a:prstGeom prst="rect">
             <a:avLst/>
@@ -7651,7 +8317,7 @@
           </a:lstStyle>
           <a:p>
             <a:r>
-              <a:rPr lang="en-US" sz="2800" b="1" dirty="0">
+              <a:rPr lang="en-US" sz="3600" b="1" dirty="0">
                 <a:latin typeface="+mj-lt"/>
               </a:rPr>
               <a:t>Content</a:t>
@@ -7659,7 +8325,7 @@
           </a:p>
           <a:p>
             <a:r>
-              <a:rPr lang="en-US" sz="2800" b="1" dirty="0">
+              <a:rPr lang="en-US" sz="3600" b="1" dirty="0">
                 <a:latin typeface="+mj-lt"/>
               </a:rPr>
               <a:t>Extraction</a:t>
@@ -7681,203 +8347,12 @@
         </p:nvGrpSpPr>
         <p:grpSpPr>
           <a:xfrm>
-            <a:off x="19915554" y="13918259"/>
-            <a:ext cx="12088446" cy="7207863"/>
+            <a:off x="19659600" y="14661537"/>
+            <a:ext cx="11711513" cy="7207863"/>
             <a:chOff x="188777" y="722592"/>
-            <a:chExt cx="10455178" cy="6423894"/>
+            <a:chExt cx="10129172" cy="6423894"/>
           </a:xfrm>
         </p:grpSpPr>
-        <p:sp>
-          <p:nvSpPr>
-            <p:cNvPr id="176" name="Slide Number Placeholder 6">
-              <a:extLst>
-                <a:ext uri="{FF2B5EF4-FFF2-40B4-BE49-F238E27FC236}">
-                  <a16:creationId xmlns:a16="http://schemas.microsoft.com/office/drawing/2014/main" id="{6DBE7F66-89A6-204A-B68C-EC527CBCF01A}"/>
-                </a:ext>
-              </a:extLst>
-            </p:cNvPr>
-            <p:cNvSpPr txBox="1">
-              <a:spLocks/>
-            </p:cNvSpPr>
-            <p:nvPr/>
-          </p:nvSpPr>
-          <p:spPr>
-            <a:xfrm>
-              <a:off x="971550" y="5251815"/>
-              <a:ext cx="523240" cy="247651"/>
-            </a:xfrm>
-            <a:prstGeom prst="rect">
-              <a:avLst/>
-            </a:prstGeom>
-          </p:spPr>
-          <p:txBody>
-            <a:bodyPr anchor="t">
-              <a:noAutofit/>
-            </a:bodyPr>
-            <a:lstStyle>
-              <a:defPPr>
-                <a:defRPr lang="en-US"/>
-              </a:defPPr>
-              <a:lvl1pPr marL="0" algn="l" defTabSz="914400" rtl="0" eaLnBrk="1" latinLnBrk="0" hangingPunct="1">
-                <a:defRPr sz="1800" kern="1200">
-                  <a:solidFill>
-                    <a:schemeClr val="tx1"/>
-                  </a:solidFill>
-                  <a:latin typeface="+mn-lt"/>
-                  <a:ea typeface="+mn-ea"/>
-                  <a:cs typeface="+mn-cs"/>
-                </a:defRPr>
-              </a:lvl1pPr>
-              <a:lvl2pPr marL="457200" algn="l" defTabSz="914400" rtl="0" eaLnBrk="1" latinLnBrk="0" hangingPunct="1">
-                <a:defRPr sz="1800" kern="1200">
-                  <a:solidFill>
-                    <a:schemeClr val="tx1"/>
-                  </a:solidFill>
-                  <a:latin typeface="+mn-lt"/>
-                  <a:ea typeface="+mn-ea"/>
-                  <a:cs typeface="+mn-cs"/>
-                </a:defRPr>
-              </a:lvl2pPr>
-              <a:lvl3pPr marL="914400" algn="l" defTabSz="914400" rtl="0" eaLnBrk="1" latinLnBrk="0" hangingPunct="1">
-                <a:defRPr sz="1800" kern="1200">
-                  <a:solidFill>
-                    <a:schemeClr val="tx1"/>
-                  </a:solidFill>
-                  <a:latin typeface="+mn-lt"/>
-                  <a:ea typeface="+mn-ea"/>
-                  <a:cs typeface="+mn-cs"/>
-                </a:defRPr>
-              </a:lvl3pPr>
-              <a:lvl4pPr marL="1371600" algn="l" defTabSz="914400" rtl="0" eaLnBrk="1" latinLnBrk="0" hangingPunct="1">
-                <a:defRPr sz="1800" kern="1200">
-                  <a:solidFill>
-                    <a:schemeClr val="tx1"/>
-                  </a:solidFill>
-                  <a:latin typeface="+mn-lt"/>
-                  <a:ea typeface="+mn-ea"/>
-                  <a:cs typeface="+mn-cs"/>
-                </a:defRPr>
-              </a:lvl4pPr>
-              <a:lvl5pPr marL="1828800" algn="l" defTabSz="914400" rtl="0" eaLnBrk="1" latinLnBrk="0" hangingPunct="1">
-                <a:defRPr sz="1800" kern="1200">
-                  <a:solidFill>
-                    <a:schemeClr val="tx1"/>
-                  </a:solidFill>
-                  <a:latin typeface="+mn-lt"/>
-                  <a:ea typeface="+mn-ea"/>
-                  <a:cs typeface="+mn-cs"/>
-                </a:defRPr>
-              </a:lvl5pPr>
-              <a:lvl6pPr marL="2286000" algn="l" defTabSz="914400" rtl="0" eaLnBrk="1" latinLnBrk="0" hangingPunct="1">
-                <a:defRPr sz="1800" kern="1200">
-                  <a:solidFill>
-                    <a:schemeClr val="tx1"/>
-                  </a:solidFill>
-                  <a:latin typeface="+mn-lt"/>
-                  <a:ea typeface="+mn-ea"/>
-                  <a:cs typeface="+mn-cs"/>
-                </a:defRPr>
-              </a:lvl6pPr>
-              <a:lvl7pPr marL="2743200" algn="l" defTabSz="914400" rtl="0" eaLnBrk="1" latinLnBrk="0" hangingPunct="1">
-                <a:defRPr sz="1800" kern="1200">
-                  <a:solidFill>
-                    <a:schemeClr val="tx1"/>
-                  </a:solidFill>
-                  <a:latin typeface="+mn-lt"/>
-                  <a:ea typeface="+mn-ea"/>
-                  <a:cs typeface="+mn-cs"/>
-                </a:defRPr>
-              </a:lvl7pPr>
-              <a:lvl8pPr marL="3200400" algn="l" defTabSz="914400" rtl="0" eaLnBrk="1" latinLnBrk="0" hangingPunct="1">
-                <a:defRPr sz="1800" kern="1200">
-                  <a:solidFill>
-                    <a:schemeClr val="tx1"/>
-                  </a:solidFill>
-                  <a:latin typeface="+mn-lt"/>
-                  <a:ea typeface="+mn-ea"/>
-                  <a:cs typeface="+mn-cs"/>
-                </a:defRPr>
-              </a:lvl8pPr>
-              <a:lvl9pPr marL="3657600" algn="l" defTabSz="914400" rtl="0" eaLnBrk="1" latinLnBrk="0" hangingPunct="1">
-                <a:defRPr sz="1800" kern="1200">
-                  <a:solidFill>
-                    <a:schemeClr val="tx1"/>
-                  </a:solidFill>
-                  <a:latin typeface="+mn-lt"/>
-                  <a:ea typeface="+mn-ea"/>
-                  <a:cs typeface="+mn-cs"/>
-                </a:defRPr>
-              </a:lvl9pPr>
-            </a:lstStyle>
-            <a:p>
-              <a:pPr marL="0" marR="0" lvl="0" indent="0" algn="l" defTabSz="914400" rtl="0" eaLnBrk="1" fontAlgn="auto" latinLnBrk="0" hangingPunct="1">
-                <a:lnSpc>
-                  <a:spcPct val="100000"/>
-                </a:lnSpc>
-                <a:spcBef>
-                  <a:spcPts val="0"/>
-                </a:spcBef>
-                <a:spcAft>
-                  <a:spcPts val="600"/>
-                </a:spcAft>
-                <a:buClrTx/>
-                <a:buSzTx/>
-                <a:buFontTx/>
-                <a:buNone/>
-                <a:tabLst/>
-                <a:defRPr/>
-              </a:pPr>
-              <a:fld id="{294A09A9-5501-47C1-A89A-A340965A2BE2}" type="slidenum">
-                <a:rPr kumimoji="0" lang="en-US" sz="2100" b="0" i="0" u="none" strike="noStrike" kern="1200" cap="none" spc="0" normalizeH="0" baseline="0" noProof="0" smtClean="0">
-                  <a:ln>
-                    <a:noFill/>
-                  </a:ln>
-                  <a:solidFill>
-                    <a:prstClr val="black"/>
-                  </a:solidFill>
-                  <a:effectLst/>
-                  <a:uLnTx/>
-                  <a:uFillTx/>
-                  <a:latin typeface="+mj-lt"/>
-                  <a:ea typeface="+mn-ea"/>
-                  <a:cs typeface="+mn-cs"/>
-                </a:rPr>
-                <a:pPr marL="0" marR="0" lvl="0" indent="0" algn="l" defTabSz="914400" rtl="0" eaLnBrk="1" fontAlgn="auto" latinLnBrk="0" hangingPunct="1">
-                  <a:lnSpc>
-                    <a:spcPct val="100000"/>
-                  </a:lnSpc>
-                  <a:spcBef>
-                    <a:spcPts val="0"/>
-                  </a:spcBef>
-                  <a:spcAft>
-                    <a:spcPts val="600"/>
-                  </a:spcAft>
-                  <a:buClrTx/>
-                  <a:buSzTx/>
-                  <a:buFontTx/>
-                  <a:buNone/>
-                  <a:tabLst/>
-                  <a:defRPr/>
-                </a:pPr>
-                <a:t>1</a:t>
-              </a:fld>
-              <a:endParaRPr kumimoji="0" lang="en-US" sz="2100" b="0" i="0" u="none" strike="noStrike" kern="1200" cap="none" spc="0" normalizeH="0" baseline="0" noProof="0" dirty="0">
-                <a:ln>
-                  <a:noFill/>
-                </a:ln>
-                <a:solidFill>
-                  <a:prstClr val="black"/>
-                </a:solidFill>
-                <a:effectLst/>
-                <a:uLnTx/>
-                <a:uFillTx/>
-                <a:latin typeface="+mj-lt"/>
-                <a:ea typeface="+mn-ea"/>
-                <a:cs typeface="+mn-cs"/>
-              </a:endParaRPr>
-            </a:p>
-          </p:txBody>
-        </p:sp>
         <p:sp>
           <p:nvSpPr>
             <p:cNvPr id="177" name="TextBox 176">
@@ -7893,9 +8368,9 @@
           <p:spPr>
             <a:xfrm>
               <a:off x="649133" y="722592"/>
-              <a:ext cx="1170513" cy="415498"/>
+              <a:ext cx="1041738" cy="409700"/>
             </a:xfrm>
-            <a:prstGeom prst="rect">
+            <a:prstGeom prst="roundRect">
               <a:avLst/>
             </a:prstGeom>
             <a:noFill/>
@@ -7956,9 +8431,9 @@
           <p:spPr>
             <a:xfrm>
               <a:off x="5030770" y="722592"/>
-              <a:ext cx="1933543" cy="415498"/>
+              <a:ext cx="1704648" cy="409700"/>
             </a:xfrm>
-            <a:prstGeom prst="rect">
+            <a:prstGeom prst="roundRect">
               <a:avLst/>
             </a:prstGeom>
             <a:noFill/>
@@ -8021,7 +8496,7 @@
               <a:off x="188777" y="2545898"/>
               <a:ext cx="2103120" cy="1051560"/>
             </a:xfrm>
-            <a:prstGeom prst="rect">
+            <a:prstGeom prst="roundRect">
               <a:avLst/>
             </a:prstGeom>
             <a:solidFill>
@@ -8096,11 +8571,13 @@
               <a:off x="2908794" y="6094926"/>
               <a:ext cx="2103120" cy="1051560"/>
             </a:xfrm>
-            <a:prstGeom prst="rect">
+            <a:prstGeom prst="roundRect">
               <a:avLst/>
             </a:prstGeom>
             <a:solidFill>
-              <a:srgbClr val="0721B3"/>
+              <a:schemeClr val="bg2">
+                <a:lumMod val="25000"/>
+              </a:schemeClr>
             </a:solidFill>
             <a:ln w="12700" cap="flat" cmpd="sng" algn="ctr">
               <a:solidFill>
@@ -8202,11 +8679,13 @@
               <a:off x="2908794" y="1318505"/>
               <a:ext cx="2103120" cy="1051560"/>
             </a:xfrm>
-            <a:prstGeom prst="rect">
+            <a:prstGeom prst="roundRect">
               <a:avLst/>
             </a:prstGeom>
             <a:solidFill>
-              <a:srgbClr val="0721B3"/>
+              <a:schemeClr val="bg2">
+                <a:lumMod val="25000"/>
+              </a:schemeClr>
             </a:solidFill>
             <a:ln w="12700" cap="flat" cmpd="sng" algn="ctr">
               <a:solidFill>
@@ -8308,9 +8787,9 @@
             <p:nvPr/>
           </p:nvCxnSpPr>
           <p:spPr>
-            <a:xfrm>
-              <a:off x="5011914" y="6620706"/>
-              <a:ext cx="240912" cy="12700"/>
+            <a:xfrm flipV="1">
+              <a:off x="5011914" y="6610533"/>
+              <a:ext cx="252147" cy="10173"/>
             </a:xfrm>
             <a:prstGeom prst="bentConnector3">
               <a:avLst>
@@ -8346,11 +8825,13 @@
               <a:off x="2908794" y="4900820"/>
               <a:ext cx="2103120" cy="1051560"/>
             </a:xfrm>
-            <a:prstGeom prst="rect">
+            <a:prstGeom prst="roundRect">
               <a:avLst/>
             </a:prstGeom>
             <a:solidFill>
-              <a:srgbClr val="0721B3"/>
+              <a:schemeClr val="bg2">
+                <a:lumMod val="25000"/>
+              </a:schemeClr>
             </a:solidFill>
             <a:ln w="12700" cap="flat" cmpd="sng" algn="ctr">
               <a:solidFill>
@@ -8490,7 +8971,7 @@
               <a:off x="188777" y="5536469"/>
               <a:ext cx="2103120" cy="1051560"/>
             </a:xfrm>
-            <a:prstGeom prst="rect">
+            <a:prstGeom prst="roundRect">
               <a:avLst/>
             </a:prstGeom>
             <a:solidFill>
@@ -8543,41 +9024,7 @@
                   <a:ea typeface="+mn-ea"/>
                   <a:cs typeface="+mn-cs"/>
                 </a:rPr>
-                <a:t>Web </a:t>
-              </a:r>
-              <a:r>
-                <a:rPr kumimoji="0" lang="en-US" sz="2100" b="0" i="0" u="none" strike="noStrike" kern="0" cap="none" spc="0" normalizeH="0" baseline="0" noProof="0" dirty="0" err="1">
-                  <a:ln>
-                    <a:noFill/>
-                  </a:ln>
-                  <a:solidFill>
-                    <a:prstClr val="black"/>
-                  </a:solidFill>
-                  <a:effectLst/>
-                  <a:uLnTx/>
-                  <a:uFillTx/>
-                  <a:latin typeface="+mj-lt"/>
-                  <a:ea typeface="+mn-ea"/>
-                  <a:cs typeface="+mn-cs"/>
-                </a:rPr>
-                <a:t>Conent</a:t>
-              </a:r>
-              <a:r>
-                <a:rPr kumimoji="0" lang="en-US" sz="2100" b="0" i="0" u="none" strike="noStrike" kern="0" cap="none" spc="0" normalizeH="0" baseline="0" noProof="0" dirty="0">
-                  <a:ln>
-                    <a:noFill/>
-                  </a:ln>
-                  <a:solidFill>
-                    <a:prstClr val="black"/>
-                  </a:solidFill>
-                  <a:effectLst/>
-                  <a:uLnTx/>
-                  <a:uFillTx/>
-                  <a:latin typeface="+mj-lt"/>
-                  <a:ea typeface="+mn-ea"/>
-                  <a:cs typeface="+mn-cs"/>
-                </a:rPr>
-                <a:t> Provided by Teacher</a:t>
+                <a:t>Web Content Provided by Teacher</a:t>
               </a:r>
             </a:p>
           </p:txBody>
@@ -8637,11 +9084,13 @@
               <a:off x="2908794" y="2512610"/>
               <a:ext cx="2103120" cy="1051560"/>
             </a:xfrm>
-            <a:prstGeom prst="rect">
+            <a:prstGeom prst="roundRect">
               <a:avLst/>
             </a:prstGeom>
             <a:solidFill>
-              <a:srgbClr val="0721B3"/>
+              <a:schemeClr val="bg2">
+                <a:lumMod val="25000"/>
+              </a:schemeClr>
             </a:solidFill>
             <a:ln w="12700" cap="flat" cmpd="sng" algn="ctr">
               <a:solidFill>
@@ -8741,9 +9190,9 @@
           <p:spPr>
             <a:xfrm>
               <a:off x="7795098" y="764913"/>
-              <a:ext cx="2848857" cy="415498"/>
+              <a:ext cx="2487778" cy="409700"/>
             </a:xfrm>
-            <a:prstGeom prst="rect">
+            <a:prstGeom prst="roundRect">
               <a:avLst/>
             </a:prstGeom>
             <a:noFill/>
@@ -8803,10 +9252,10 @@
           </p:nvSpPr>
           <p:spPr>
             <a:xfrm>
-              <a:off x="8234251" y="3564170"/>
+              <a:off x="8214829" y="3701616"/>
               <a:ext cx="2103120" cy="1051560"/>
             </a:xfrm>
-            <a:prstGeom prst="rect">
+            <a:prstGeom prst="roundRect">
               <a:avLst/>
             </a:prstGeom>
             <a:solidFill>
@@ -8881,11 +9330,13 @@
               <a:off x="2908794" y="3706715"/>
               <a:ext cx="2103120" cy="1051560"/>
             </a:xfrm>
-            <a:prstGeom prst="rect">
+            <a:prstGeom prst="roundRect">
               <a:avLst/>
             </a:prstGeom>
             <a:solidFill>
-              <a:srgbClr val="0721B3"/>
+              <a:schemeClr val="bg2">
+                <a:lumMod val="25000"/>
+              </a:schemeClr>
             </a:solidFill>
             <a:ln w="12700" cap="flat" cmpd="sng" algn="ctr">
               <a:solidFill>
@@ -9063,14 +9514,16 @@
           </p:nvSpPr>
           <p:spPr>
             <a:xfrm>
-              <a:off x="5252826" y="2545898"/>
+              <a:off x="5264062" y="2510061"/>
               <a:ext cx="2103120" cy="1051560"/>
             </a:xfrm>
-            <a:prstGeom prst="rect">
+            <a:prstGeom prst="roundRect">
               <a:avLst/>
             </a:prstGeom>
             <a:solidFill>
-              <a:srgbClr val="0721B3"/>
+              <a:schemeClr val="bg2">
+                <a:lumMod val="25000"/>
+              </a:schemeClr>
             </a:solidFill>
             <a:ln w="12700" cap="flat" cmpd="sng" algn="ctr">
               <a:solidFill>
@@ -9141,9 +9594,9 @@
             <p:nvPr/>
           </p:nvCxnSpPr>
           <p:spPr>
-            <a:xfrm>
-              <a:off x="5011914" y="3038390"/>
-              <a:ext cx="240912" cy="33288"/>
+            <a:xfrm flipV="1">
+              <a:off x="5011914" y="3035841"/>
+              <a:ext cx="252148" cy="2549"/>
             </a:xfrm>
             <a:prstGeom prst="bentConnector3">
               <a:avLst>
@@ -9176,14 +9629,16 @@
           </p:nvSpPr>
           <p:spPr>
             <a:xfrm>
-              <a:off x="5252826" y="6094926"/>
+              <a:off x="5264061" y="6084753"/>
               <a:ext cx="2103120" cy="1051560"/>
             </a:xfrm>
-            <a:prstGeom prst="rect">
+            <a:prstGeom prst="roundRect">
               <a:avLst/>
             </a:prstGeom>
             <a:solidFill>
-              <a:srgbClr val="0721B3"/>
+              <a:schemeClr val="bg2">
+                <a:lumMod val="25000"/>
+              </a:schemeClr>
             </a:solidFill>
             <a:ln w="12700" cap="flat" cmpd="sng" algn="ctr">
               <a:solidFill>
@@ -9256,11 +9711,11 @@
           <p:spPr>
             <a:xfrm>
               <a:off x="5011914" y="1844285"/>
-              <a:ext cx="3222338" cy="2245665"/>
+              <a:ext cx="3202916" cy="2383111"/>
             </a:xfrm>
             <a:prstGeom prst="bentConnector3">
               <a:avLst>
-                <a:gd name="adj1" fmla="val 89269"/>
+                <a:gd name="adj1" fmla="val 50000"/>
               </a:avLst>
             </a:prstGeom>
             <a:noFill/>
@@ -9293,12 +9748,12 @@
           </p:nvCxnSpPr>
           <p:spPr>
             <a:xfrm>
-              <a:off x="7355946" y="3071678"/>
-              <a:ext cx="878305" cy="1018272"/>
+              <a:off x="7367182" y="3035841"/>
+              <a:ext cx="847648" cy="1191555"/>
             </a:xfrm>
             <a:prstGeom prst="bentConnector3">
               <a:avLst>
-                <a:gd name="adj1" fmla="val 60593"/>
+                <a:gd name="adj1" fmla="val 50000"/>
               </a:avLst>
             </a:prstGeom>
             <a:noFill/>
@@ -9331,8 +9786,8 @@
           </p:nvCxnSpPr>
           <p:spPr>
             <a:xfrm flipV="1">
-              <a:off x="5011914" y="4089950"/>
-              <a:ext cx="3222338" cy="142545"/>
+              <a:off x="5011914" y="4227396"/>
+              <a:ext cx="3202916" cy="5099"/>
             </a:xfrm>
             <a:prstGeom prst="bentConnector3">
               <a:avLst>
@@ -9369,12 +9824,12 @@
           </p:nvCxnSpPr>
           <p:spPr>
             <a:xfrm flipV="1">
-              <a:off x="5011914" y="4089950"/>
-              <a:ext cx="3222338" cy="1336650"/>
+              <a:off x="5011914" y="4227396"/>
+              <a:ext cx="3202916" cy="1199204"/>
             </a:xfrm>
             <a:prstGeom prst="bentConnector3">
               <a:avLst>
-                <a:gd name="adj1" fmla="val 90496"/>
+                <a:gd name="adj1" fmla="val 50000"/>
               </a:avLst>
             </a:prstGeom>
             <a:noFill/>
@@ -9407,12 +9862,12 @@
           </p:nvCxnSpPr>
           <p:spPr>
             <a:xfrm flipV="1">
-              <a:off x="7355946" y="4089950"/>
-              <a:ext cx="878305" cy="2530756"/>
+              <a:off x="7367181" y="4227396"/>
+              <a:ext cx="847649" cy="2383137"/>
             </a:xfrm>
             <a:prstGeom prst="bentConnector3">
               <a:avLst>
-                <a:gd name="adj1" fmla="val 63242"/>
+                <a:gd name="adj1" fmla="val 50000"/>
               </a:avLst>
             </a:prstGeom>
             <a:noFill/>
@@ -9551,13 +10006,13 @@
           <p:nvPr>
             <p:extLst>
               <p:ext uri="{D42A27DB-BD31-4B8C-83A1-F6EECF244321}">
-                <p14:modId xmlns:p14="http://schemas.microsoft.com/office/powerpoint/2010/main" val="1547393685"/>
+                <p14:modId xmlns:p14="http://schemas.microsoft.com/office/powerpoint/2010/main" val="3514076931"/>
               </p:ext>
             </p:extLst>
           </p:nvPr>
         </p:nvGraphicFramePr>
         <p:xfrm>
-          <a:off x="1252217" y="35128200"/>
+          <a:off x="1126888" y="34925493"/>
           <a:ext cx="14284562" cy="3456840"/>
         </p:xfrm>
         <a:graphic>
@@ -9597,7 +10052,7 @@
                     <a:p>
                       <a:pPr algn="ctr"/>
                       <a:r>
-                        <a:rPr lang="en-US" sz="3200" dirty="0">
+                        <a:rPr lang="en-US" sz="3600" dirty="0">
                           <a:solidFill>
                             <a:schemeClr val="tx1"/>
                           </a:solidFill>
@@ -9615,10 +10070,10 @@
                     <a:p>
                       <a:pPr algn="ctr"/>
                       <a:r>
-                        <a:rPr lang="en-US" sz="3200" dirty="0"/>
+                        <a:rPr lang="en-US" sz="3600" dirty="0"/>
                         <a:t>This Project</a:t>
                       </a:r>
-                      <a:endParaRPr lang="en-US" sz="3200" dirty="0">
+                      <a:endParaRPr lang="en-US" sz="3600" dirty="0">
                         <a:solidFill>
                           <a:schemeClr val="accent6"/>
                         </a:solidFill>
@@ -9634,14 +10089,14 @@
                     <a:p>
                       <a:pPr algn="ctr"/>
                       <a:r>
-                        <a:rPr lang="en-US" sz="3200" dirty="0" err="1"/>
+                        <a:rPr lang="en-US" sz="3600" dirty="0" err="1"/>
                         <a:t>Khanmigo</a:t>
                       </a:r>
                       <a:r>
-                        <a:rPr lang="en-US" sz="3200" dirty="0"/>
+                        <a:rPr lang="en-US" sz="3600" dirty="0"/>
                         <a:t> (Khan Academy)</a:t>
                       </a:r>
-                      <a:endParaRPr lang="en-US" sz="3200" dirty="0">
+                      <a:endParaRPr lang="en-US" sz="3600" dirty="0">
                         <a:solidFill>
                           <a:schemeClr val="accent6"/>
                         </a:solidFill>
@@ -9870,10 +10325,10 @@
       </p:graphicFrame>
       <p:sp>
         <p:nvSpPr>
-          <p:cNvPr id="205" name="TextBox 204">
+          <p:cNvPr id="2" name="TextBox 1">
             <a:extLst>
               <a:ext uri="{FF2B5EF4-FFF2-40B4-BE49-F238E27FC236}">
-                <a16:creationId xmlns:a16="http://schemas.microsoft.com/office/drawing/2014/main" id="{3C2BB3AC-80EE-6B4C-B50A-BD0C65EA8DB6}"/>
+                <a16:creationId xmlns:a16="http://schemas.microsoft.com/office/drawing/2014/main" id="{F1022784-D4CD-56FF-28C2-499A603346C7}"/>
               </a:ext>
             </a:extLst>
           </p:cNvPr>
@@ -9882,8 +10337,8 @@
         </p:nvSpPr>
         <p:spPr>
           <a:xfrm>
-            <a:off x="17291288" y="36638742"/>
-            <a:ext cx="14525194" cy="2677656"/>
+            <a:off x="987522" y="21646659"/>
+            <a:ext cx="14525194" cy="830997"/>
           </a:xfrm>
           <a:prstGeom prst="rect">
             <a:avLst/>
@@ -9900,138 +10355,8 @@
             </a:defPPr>
           </a:lstStyle>
           <a:p>
-            <a:pPr marL="514350" indent="-514350">
-              <a:buAutoNum type="arabicPeriod"/>
-            </a:pPr>
-            <a:r>
-              <a:rPr lang="en-US" sz="2800" dirty="0"/>
-              <a:t>Link with educational platform (e.g., Lehigh Course Site)</a:t>
-            </a:r>
-          </a:p>
-          <a:p>
-            <a:pPr marL="514350" indent="-514350">
-              <a:buAutoNum type="arabicPeriod"/>
-            </a:pPr>
-            <a:r>
-              <a:rPr lang="en-US" sz="2800" dirty="0"/>
-              <a:t>Deploy on cloud infrastructure for scalability</a:t>
-            </a:r>
-          </a:p>
-          <a:p>
-            <a:pPr marL="514350" indent="-514350">
-              <a:buAutoNum type="arabicPeriod"/>
-            </a:pPr>
-            <a:r>
-              <a:rPr lang="en-US" sz="2800" dirty="0"/>
-              <a:t>Change the backend model to </a:t>
-            </a:r>
-            <a:r>
-              <a:rPr lang="en-US" sz="2800" dirty="0" err="1"/>
-              <a:t>LLaVA</a:t>
-            </a:r>
-            <a:r>
-              <a:rPr lang="en-US" sz="2800" dirty="0"/>
-              <a:t> 1.6 to support image inputs</a:t>
-            </a:r>
-          </a:p>
-          <a:p>
-            <a:pPr marL="514350" indent="-514350">
-              <a:buAutoNum type="arabicPeriod"/>
-            </a:pPr>
-            <a:r>
-              <a:rPr lang="en-US" sz="2800" dirty="0"/>
-              <a:t>Accept video inputs</a:t>
-            </a:r>
-          </a:p>
-          <a:p>
-            <a:pPr marL="514350" indent="-514350">
-              <a:buAutoNum type="arabicPeriod"/>
-            </a:pPr>
-            <a:r>
-              <a:rPr lang="en-US" sz="2800" dirty="0"/>
-              <a:t>Preload state and national educational requirements to ensure lesson plans meet educational benchmarks</a:t>
-            </a:r>
-          </a:p>
-        </p:txBody>
-      </p:sp>
-      <p:sp>
-        <p:nvSpPr>
-          <p:cNvPr id="206" name="TextBox 205">
-            <a:extLst>
-              <a:ext uri="{FF2B5EF4-FFF2-40B4-BE49-F238E27FC236}">
-                <a16:creationId xmlns:a16="http://schemas.microsoft.com/office/drawing/2014/main" id="{732BA83C-EEC1-FE4F-AE0B-7FC61DF238A9}"/>
-              </a:ext>
-            </a:extLst>
-          </p:cNvPr>
-          <p:cNvSpPr txBox="1"/>
-          <p:nvPr/>
-        </p:nvSpPr>
-        <p:spPr>
-          <a:xfrm>
-            <a:off x="17291288" y="36033497"/>
-            <a:ext cx="14525194" cy="646331"/>
-          </a:xfrm>
-          <a:prstGeom prst="rect">
-            <a:avLst/>
-          </a:prstGeom>
-          <a:noFill/>
-        </p:spPr>
-        <p:txBody>
-          <a:bodyPr wrap="square" rtlCol="0">
-            <a:spAutoFit/>
-          </a:bodyPr>
-          <a:lstStyle>
-            <a:defPPr>
-              <a:defRPr kern="1200"/>
-            </a:defPPr>
-          </a:lstStyle>
-          <a:p>
-            <a:r>
-              <a:rPr lang="en-US" sz="3600" dirty="0">
-                <a:solidFill>
-                  <a:srgbClr val="235078"/>
-                </a:solidFill>
-                <a:latin typeface="Libre Baskerville" panose="02000000000000000000" pitchFamily="2" charset="0"/>
-              </a:rPr>
-              <a:t>Future world</a:t>
-            </a:r>
-          </a:p>
-        </p:txBody>
-      </p:sp>
-      <p:sp>
-        <p:nvSpPr>
-          <p:cNvPr id="2" name="TextBox 1">
-            <a:extLst>
-              <a:ext uri="{FF2B5EF4-FFF2-40B4-BE49-F238E27FC236}">
-                <a16:creationId xmlns:a16="http://schemas.microsoft.com/office/drawing/2014/main" id="{F1022784-D4CD-56FF-28C2-499A603346C7}"/>
-              </a:ext>
-            </a:extLst>
-          </p:cNvPr>
-          <p:cNvSpPr txBox="1"/>
-          <p:nvPr/>
-        </p:nvSpPr>
-        <p:spPr>
-          <a:xfrm>
-            <a:off x="1107838" y="25916709"/>
-            <a:ext cx="14525194" cy="646331"/>
-          </a:xfrm>
-          <a:prstGeom prst="rect">
-            <a:avLst/>
-          </a:prstGeom>
-          <a:noFill/>
-        </p:spPr>
-        <p:txBody>
-          <a:bodyPr wrap="square" rtlCol="0">
-            <a:spAutoFit/>
-          </a:bodyPr>
-          <a:lstStyle>
-            <a:defPPr>
-              <a:defRPr kern="1200"/>
-            </a:defPPr>
-          </a:lstStyle>
-          <a:p>
-            <a:r>
-              <a:rPr lang="en-US" sz="3600" dirty="0">
+            <a:r>
+              <a:rPr lang="en-US" sz="4800" b="1" dirty="0">
                 <a:solidFill>
                   <a:srgbClr val="235078"/>
                 </a:solidFill>
@@ -10039,6 +10364,12 @@
               </a:rPr>
               <a:t>Model Selection</a:t>
             </a:r>
+            <a:endParaRPr lang="en-US" sz="4000" b="1" dirty="0">
+              <a:solidFill>
+                <a:srgbClr val="235078"/>
+              </a:solidFill>
+              <a:latin typeface="Libre Baskerville" panose="02000000000000000000" pitchFamily="2" charset="0"/>
+            </a:endParaRPr>
           </a:p>
         </p:txBody>
       </p:sp>
@@ -10056,8 +10387,8 @@
         </p:nvSpPr>
         <p:spPr>
           <a:xfrm>
-            <a:off x="1032279" y="26982428"/>
-            <a:ext cx="14525194" cy="15727382"/>
+            <a:off x="1025622" y="22944940"/>
+            <a:ext cx="14525194" cy="19482256"/>
           </a:xfrm>
           <a:prstGeom prst="rect">
             <a:avLst/>
@@ -10088,14 +10419,14 @@
               <a:buChar char="•"/>
             </a:pPr>
             <a:r>
-              <a:rPr lang="en-US" sz="2800" b="1" dirty="0">
+              <a:rPr lang="en-US" sz="3600" b="1" dirty="0">
                 <a:ea typeface="Open Sans" panose="020B0606030504020204" pitchFamily="34" charset="0"/>
                 <a:cs typeface="Open Sans" panose="020B0606030504020204" pitchFamily="34" charset="0"/>
               </a:rPr>
               <a:t>Resource Input</a:t>
             </a:r>
             <a:r>
-              <a:rPr lang="en-US" sz="2800" dirty="0">
+              <a:rPr lang="en-US" sz="3600" dirty="0">
                 <a:ea typeface="Open Sans" panose="020B0606030504020204" pitchFamily="34" charset="0"/>
                 <a:cs typeface="Open Sans" panose="020B0606030504020204" pitchFamily="34" charset="0"/>
               </a:rPr>
@@ -10108,56 +10439,56 @@
               <a:buChar char="•"/>
             </a:pPr>
             <a:r>
-              <a:rPr lang="en-US" sz="2800" b="1" dirty="0">
+              <a:rPr lang="en-US" sz="3600" b="1" dirty="0">
                 <a:ea typeface="Open Sans" panose="020B0606030504020204" pitchFamily="34" charset="0"/>
                 <a:cs typeface="Open Sans" panose="020B0606030504020204" pitchFamily="34" charset="0"/>
               </a:rPr>
               <a:t>Extraction Tools</a:t>
             </a:r>
             <a:r>
-              <a:rPr lang="en-US" sz="2800" dirty="0">
+              <a:rPr lang="en-US" sz="3600" dirty="0">
                 <a:ea typeface="Open Sans" panose="020B0606030504020204" pitchFamily="34" charset="0"/>
                 <a:cs typeface="Open Sans" panose="020B0606030504020204" pitchFamily="34" charset="0"/>
               </a:rPr>
               <a:t>: </a:t>
             </a:r>
             <a:r>
-              <a:rPr lang="en-US" sz="2800" dirty="0" err="1">
+              <a:rPr lang="en-US" sz="3600" dirty="0" err="1">
                 <a:ea typeface="Open Sans" panose="020B0606030504020204" pitchFamily="34" charset="0"/>
                 <a:cs typeface="Open Sans" panose="020B0606030504020204" pitchFamily="34" charset="0"/>
               </a:rPr>
               <a:t>PyMuPDF</a:t>
             </a:r>
             <a:r>
-              <a:rPr lang="en-US" sz="2800" dirty="0">
+              <a:rPr lang="en-US" sz="3600" dirty="0">
                 <a:ea typeface="Open Sans" panose="020B0606030504020204" pitchFamily="34" charset="0"/>
                 <a:cs typeface="Open Sans" panose="020B0606030504020204" pitchFamily="34" charset="0"/>
               </a:rPr>
               <a:t> (text), </a:t>
             </a:r>
             <a:r>
-              <a:rPr lang="en-US" sz="2800" dirty="0" err="1">
+              <a:rPr lang="en-US" sz="3600" dirty="0" err="1">
                 <a:ea typeface="Open Sans" panose="020B0606030504020204" pitchFamily="34" charset="0"/>
                 <a:cs typeface="Open Sans" panose="020B0606030504020204" pitchFamily="34" charset="0"/>
               </a:rPr>
               <a:t>PDFPlumber</a:t>
             </a:r>
             <a:r>
-              <a:rPr lang="en-US" sz="2800" dirty="0">
+              <a:rPr lang="en-US" sz="3600" dirty="0">
                 <a:ea typeface="Open Sans" panose="020B0606030504020204" pitchFamily="34" charset="0"/>
                 <a:cs typeface="Open Sans" panose="020B0606030504020204" pitchFamily="34" charset="0"/>
               </a:rPr>
               <a:t> &amp; Pillow (images/tables), </a:t>
             </a:r>
             <a:r>
-              <a:rPr lang="en-US" sz="2800" dirty="0" err="1">
+              <a:rPr lang="en-US" sz="3600" dirty="0" err="1">
                 <a:ea typeface="Open Sans" panose="020B0606030504020204" pitchFamily="34" charset="0"/>
                 <a:cs typeface="Open Sans" panose="020B0606030504020204" pitchFamily="34" charset="0"/>
               </a:rPr>
               <a:t>BeautifulSoup</a:t>
             </a:r>
             <a:r>
-              <a:rPr lang="en-US" sz="2800" dirty="0">
+              <a:rPr lang="en-US" sz="3600" dirty="0">
                 <a:ea typeface="Open Sans" panose="020B0606030504020204" pitchFamily="34" charset="0"/>
                 <a:cs typeface="Open Sans" panose="020B0606030504020204" pitchFamily="34" charset="0"/>
               </a:rPr>
@@ -10170,14 +10501,14 @@
               <a:buChar char="•"/>
             </a:pPr>
             <a:r>
-              <a:rPr lang="en-US" sz="2800" b="1" dirty="0">
+              <a:rPr lang="en-US" sz="3600" b="1" dirty="0">
                 <a:ea typeface="Open Sans" panose="020B0606030504020204" pitchFamily="34" charset="0"/>
                 <a:cs typeface="Open Sans" panose="020B0606030504020204" pitchFamily="34" charset="0"/>
               </a:rPr>
               <a:t>Model Backend</a:t>
             </a:r>
             <a:r>
-              <a:rPr lang="en-US" sz="2800" dirty="0">
+              <a:rPr lang="en-US" sz="3600" dirty="0">
                 <a:ea typeface="Open Sans" panose="020B0606030504020204" pitchFamily="34" charset="0"/>
                 <a:cs typeface="Open Sans" panose="020B0606030504020204" pitchFamily="34" charset="0"/>
               </a:rPr>
@@ -10190,42 +10521,42 @@
               <a:buChar char="•"/>
             </a:pPr>
             <a:r>
-              <a:rPr lang="en-US" sz="2800" b="1" dirty="0">
+              <a:rPr lang="en-US" sz="3600" b="1" dirty="0">
                 <a:ea typeface="Open Sans" panose="020B0606030504020204" pitchFamily="34" charset="0"/>
                 <a:cs typeface="Open Sans" panose="020B0606030504020204" pitchFamily="34" charset="0"/>
               </a:rPr>
               <a:t>Frontend</a:t>
             </a:r>
             <a:r>
-              <a:rPr lang="en-US" sz="2800" dirty="0">
+              <a:rPr lang="en-US" sz="3600" dirty="0">
                 <a:ea typeface="Open Sans" panose="020B0606030504020204" pitchFamily="34" charset="0"/>
                 <a:cs typeface="Open Sans" panose="020B0606030504020204" pitchFamily="34" charset="0"/>
               </a:rPr>
               <a:t>: </a:t>
             </a:r>
             <a:r>
-              <a:rPr lang="en-US" sz="2800" dirty="0" err="1">
+              <a:rPr lang="en-US" sz="3600" dirty="0" err="1">
                 <a:ea typeface="Open Sans" panose="020B0606030504020204" pitchFamily="34" charset="0"/>
                 <a:cs typeface="Open Sans" panose="020B0606030504020204" pitchFamily="34" charset="0"/>
               </a:rPr>
               <a:t>Streamlit</a:t>
             </a:r>
             <a:r>
-              <a:rPr lang="en-US" sz="2800" dirty="0">
+              <a:rPr lang="en-US" sz="3600" dirty="0">
                 <a:ea typeface="Open Sans" panose="020B0606030504020204" pitchFamily="34" charset="0"/>
                 <a:cs typeface="Open Sans" panose="020B0606030504020204" pitchFamily="34" charset="0"/>
               </a:rPr>
               <a:t> interface for lesson generation hosted on </a:t>
             </a:r>
             <a:r>
-              <a:rPr lang="en-US" sz="2800" dirty="0" err="1">
+              <a:rPr lang="en-US" sz="3600" dirty="0" err="1">
                 <a:ea typeface="Open Sans" panose="020B0606030504020204" pitchFamily="34" charset="0"/>
                 <a:cs typeface="Open Sans" panose="020B0606030504020204" pitchFamily="34" charset="0"/>
               </a:rPr>
               <a:t>lehigh</a:t>
             </a:r>
             <a:r>
-              <a:rPr lang="en-US" sz="2800" dirty="0">
+              <a:rPr lang="en-US" sz="3600" dirty="0">
                 <a:ea typeface="Open Sans" panose="020B0606030504020204" pitchFamily="34" charset="0"/>
                 <a:cs typeface="Open Sans" panose="020B0606030504020204" pitchFamily="34" charset="0"/>
               </a:rPr>
@@ -10248,81 +10579,12 @@
                 <a:ea typeface="Open Sans" panose="020B0606030504020204" pitchFamily="34" charset="0"/>
                 <a:cs typeface="Open Sans" panose="020B0606030504020204" pitchFamily="34" charset="0"/>
               </a:rPr>
-              <a:t>Models  Tested:</a:t>
-            </a:r>
-          </a:p>
-          <a:p>
-            <a:pPr marL="342900" indent="-342900">
-              <a:buFont typeface="Arial" panose="020B0604020202020204" pitchFamily="34" charset="0"/>
-              <a:buChar char="•"/>
-            </a:pPr>
-            <a:r>
-              <a:rPr lang="en-US" sz="2800" b="1" dirty="0" err="1">
-                <a:solidFill>
-                  <a:prstClr val="black"/>
-                </a:solidFill>
-                <a:ea typeface="Open Sans" panose="020B0606030504020204" pitchFamily="34" charset="0"/>
-                <a:cs typeface="Open Sans" panose="020B0606030504020204" pitchFamily="34" charset="0"/>
-              </a:rPr>
-              <a:t>LLaVA</a:t>
-            </a:r>
-            <a:r>
-              <a:rPr lang="en-US" sz="2800" b="1" dirty="0">
-                <a:solidFill>
-                  <a:prstClr val="black"/>
-                </a:solidFill>
-                <a:ea typeface="Open Sans" panose="020B0606030504020204" pitchFamily="34" charset="0"/>
-                <a:cs typeface="Open Sans" panose="020B0606030504020204" pitchFamily="34" charset="0"/>
-              </a:rPr>
-              <a:t> 1.5: </a:t>
-            </a:r>
-            <a:r>
-              <a:rPr lang="en-US" sz="2800" dirty="0">
-                <a:solidFill>
-                  <a:prstClr val="black"/>
-                </a:solidFill>
-                <a:ea typeface="Open Sans" panose="020B0606030504020204" pitchFamily="34" charset="0"/>
-                <a:cs typeface="Open Sans" panose="020B0606030504020204" pitchFamily="34" charset="0"/>
-              </a:rPr>
-              <a:t>Accepts images, text, and tables. Poor at summarizing text</a:t>
-            </a:r>
-          </a:p>
-          <a:p>
-            <a:pPr marL="342900" indent="-342900">
-              <a:buFont typeface="Arial" panose="020B0604020202020204" pitchFamily="34" charset="0"/>
-              <a:buChar char="•"/>
-            </a:pPr>
-            <a:r>
-              <a:rPr lang="en-US" sz="2800" b="1" dirty="0" err="1">
-                <a:solidFill>
-                  <a:prstClr val="black"/>
-                </a:solidFill>
-                <a:ea typeface="Open Sans" panose="020B0606030504020204" pitchFamily="34" charset="0"/>
-                <a:cs typeface="Open Sans" panose="020B0606030504020204" pitchFamily="34" charset="0"/>
-              </a:rPr>
-              <a:t>LLaVA</a:t>
-            </a:r>
-            <a:r>
-              <a:rPr lang="en-US" sz="2800" b="1" dirty="0">
-                <a:solidFill>
-                  <a:prstClr val="black"/>
-                </a:solidFill>
-                <a:ea typeface="Open Sans" panose="020B0606030504020204" pitchFamily="34" charset="0"/>
-                <a:cs typeface="Open Sans" panose="020B0606030504020204" pitchFamily="34" charset="0"/>
-              </a:rPr>
-              <a:t> 1.6: </a:t>
-            </a:r>
-            <a:r>
-              <a:rPr lang="en-US" sz="2800" dirty="0">
-                <a:solidFill>
-                  <a:prstClr val="black"/>
-                </a:solidFill>
-                <a:ea typeface="Open Sans" panose="020B0606030504020204" pitchFamily="34" charset="0"/>
-                <a:cs typeface="Open Sans" panose="020B0606030504020204" pitchFamily="34" charset="0"/>
-              </a:rPr>
-              <a:t>Accepts images, text, and tables.  Cannot be configured on Magic-02</a:t>
-            </a:r>
-            <a:endParaRPr lang="en-US" sz="2800" b="1" dirty="0">
+              <a:t>Models  Tested</a:t>
+            </a:r>
+          </a:p>
+          <a:p>
+            <a:pPr lvl="0"/>
+            <a:endParaRPr lang="en-US" sz="3600" b="1" dirty="0">
               <a:solidFill>
                 <a:prstClr val="black"/>
               </a:solidFill>
@@ -10335,70 +10597,82 @@
               <a:buFont typeface="Arial" panose="020B0604020202020204" pitchFamily="34" charset="0"/>
               <a:buChar char="•"/>
             </a:pPr>
-            <a:r>
-              <a:rPr lang="en-US" sz="2800" b="1" dirty="0" err="1">
-                <a:solidFill>
-                  <a:prstClr val="black"/>
-                </a:solidFill>
-                <a:ea typeface="Open Sans" panose="020B0606030504020204" pitchFamily="34" charset="0"/>
-                <a:cs typeface="Open Sans" panose="020B0606030504020204" pitchFamily="34" charset="0"/>
-              </a:rPr>
-              <a:t>OpenAI</a:t>
-            </a:r>
-            <a:r>
-              <a:rPr lang="en-US" sz="2800" b="1" dirty="0">
-                <a:solidFill>
-                  <a:prstClr val="black"/>
-                </a:solidFill>
-                <a:ea typeface="Open Sans" panose="020B0606030504020204" pitchFamily="34" charset="0"/>
-                <a:cs typeface="Open Sans" panose="020B0606030504020204" pitchFamily="34" charset="0"/>
-              </a:rPr>
-              <a:t> GPT-4o: </a:t>
-            </a:r>
-            <a:r>
-              <a:rPr lang="en-US" sz="2800" dirty="0">
-                <a:solidFill>
-                  <a:prstClr val="black"/>
-                </a:solidFill>
-                <a:ea typeface="Open Sans" panose="020B0606030504020204" pitchFamily="34" charset="0"/>
-                <a:cs typeface="Open Sans" panose="020B0606030504020204" pitchFamily="34" charset="0"/>
-              </a:rPr>
-              <a:t>Accepts images, text, and tables. Requires paid subscription for unlimited access</a:t>
-            </a:r>
-            <a:endParaRPr lang="en-US" sz="2800" dirty="0">
+            <a:endParaRPr lang="en-US" sz="3600" b="1" dirty="0">
+              <a:solidFill>
+                <a:prstClr val="black"/>
+              </a:solidFill>
               <a:ea typeface="Open Sans" panose="020B0606030504020204" pitchFamily="34" charset="0"/>
               <a:cs typeface="Open Sans" panose="020B0606030504020204" pitchFamily="34" charset="0"/>
             </a:endParaRPr>
           </a:p>
           <a:p>
-            <a:pPr marL="285750" indent="-285750">
-              <a:buFont typeface="Arial" panose="020B0604020202020204" pitchFamily="34" charset="0"/>
-              <a:buChar char="•"/>
-            </a:pPr>
-            <a:r>
-              <a:rPr lang="en-US" sz="2800" b="1" dirty="0">
-                <a:ea typeface="Open Sans" panose="020B0606030504020204" pitchFamily="34" charset="0"/>
-                <a:cs typeface="Open Sans" panose="020B0606030504020204" pitchFamily="34" charset="0"/>
-              </a:rPr>
-              <a:t>Llama-2-7b-chat-hf (Chosen Model): </a:t>
-            </a:r>
-            <a:r>
-              <a:rPr lang="en-US" sz="2800" dirty="0">
-                <a:solidFill>
-                  <a:prstClr val="black"/>
-                </a:solidFill>
-                <a:ea typeface="Open Sans" panose="020B0606030504020204" pitchFamily="34" charset="0"/>
-                <a:cs typeface="Open Sans" panose="020B0606030504020204" pitchFamily="34" charset="0"/>
-              </a:rPr>
-              <a:t>Accepts, text, and tables. Excels at summarizing text. Does not accept image inputs</a:t>
-            </a:r>
-            <a:endParaRPr lang="en-US" sz="2800" b="1" dirty="0">
+            <a:endParaRPr lang="en-US" sz="3600" b="1" dirty="0">
+              <a:solidFill>
+                <a:prstClr val="black"/>
+              </a:solidFill>
               <a:ea typeface="Open Sans" panose="020B0606030504020204" pitchFamily="34" charset="0"/>
               <a:cs typeface="Open Sans" panose="020B0606030504020204" pitchFamily="34" charset="0"/>
             </a:endParaRPr>
           </a:p>
           <a:p>
+            <a:endParaRPr lang="en-US" sz="3600" b="1" dirty="0">
+              <a:solidFill>
+                <a:prstClr val="black"/>
+              </a:solidFill>
+              <a:ea typeface="Open Sans" panose="020B0606030504020204" pitchFamily="34" charset="0"/>
+              <a:cs typeface="Open Sans" panose="020B0606030504020204" pitchFamily="34" charset="0"/>
+            </a:endParaRPr>
+          </a:p>
+          <a:p>
+            <a:endParaRPr lang="en-US" sz="3600" b="1" dirty="0">
+              <a:solidFill>
+                <a:prstClr val="black"/>
+              </a:solidFill>
+              <a:ea typeface="Open Sans" panose="020B0606030504020204" pitchFamily="34" charset="0"/>
+              <a:cs typeface="Open Sans" panose="020B0606030504020204" pitchFamily="34" charset="0"/>
+            </a:endParaRPr>
+          </a:p>
+          <a:p>
+            <a:endParaRPr lang="en-US" sz="3600" b="1" dirty="0">
+              <a:solidFill>
+                <a:prstClr val="black"/>
+              </a:solidFill>
+              <a:ea typeface="Open Sans" panose="020B0606030504020204" pitchFamily="34" charset="0"/>
+              <a:cs typeface="Open Sans" panose="020B0606030504020204" pitchFamily="34" charset="0"/>
+            </a:endParaRPr>
+          </a:p>
+          <a:p>
+            <a:endParaRPr lang="en-US" sz="3600" b="1" dirty="0">
+              <a:solidFill>
+                <a:prstClr val="black"/>
+              </a:solidFill>
+              <a:ea typeface="Open Sans" panose="020B0606030504020204" pitchFamily="34" charset="0"/>
+              <a:cs typeface="Open Sans" panose="020B0606030504020204" pitchFamily="34" charset="0"/>
+            </a:endParaRPr>
+          </a:p>
+          <a:p>
+            <a:endParaRPr lang="en-US" sz="3600" b="1" dirty="0">
+              <a:solidFill>
+                <a:prstClr val="black"/>
+              </a:solidFill>
+              <a:ea typeface="Open Sans" panose="020B0606030504020204" pitchFamily="34" charset="0"/>
+              <a:cs typeface="Open Sans" panose="020B0606030504020204" pitchFamily="34" charset="0"/>
+            </a:endParaRPr>
+          </a:p>
+          <a:p>
             <a:endParaRPr lang="en-US" sz="3600" dirty="0">
+              <a:ea typeface="Open Sans" panose="020B0606030504020204" pitchFamily="34" charset="0"/>
+              <a:cs typeface="Open Sans" panose="020B0606030504020204" pitchFamily="34" charset="0"/>
+            </a:endParaRPr>
+          </a:p>
+          <a:p>
+            <a:endParaRPr lang="en-US" sz="3600" b="1" dirty="0">
+              <a:ea typeface="Open Sans" panose="020B0606030504020204" pitchFamily="34" charset="0"/>
+              <a:cs typeface="Open Sans" panose="020B0606030504020204" pitchFamily="34" charset="0"/>
+            </a:endParaRPr>
+          </a:p>
+          <a:p>
+            <a:endParaRPr lang="en-US" sz="3600" b="1" dirty="0">
               <a:ea typeface="Open Sans" panose="020B0606030504020204" pitchFamily="34" charset="0"/>
               <a:cs typeface="Open Sans" panose="020B0606030504020204" pitchFamily="34" charset="0"/>
             </a:endParaRPr>
@@ -10455,10 +10729,7 @@
             </a:endParaRPr>
           </a:p>
           <a:p>
-            <a:endParaRPr lang="en-US" sz="3600" b="1" dirty="0">
-              <a:ea typeface="Open Sans" panose="020B0606030504020204" pitchFamily="34" charset="0"/>
-              <a:cs typeface="Open Sans" panose="020B0606030504020204" pitchFamily="34" charset="0"/>
-            </a:endParaRPr>
+            <a:endParaRPr lang="en-US" sz="3600" b="1" dirty="0"/>
           </a:p>
           <a:p>
             <a:r>
@@ -10473,7 +10744,7 @@
               <a:buAutoNum type="arabicPeriod"/>
             </a:pPr>
             <a:r>
-              <a:rPr lang="en-US" sz="2800" dirty="0"/>
+              <a:rPr lang="en-US" sz="3600" dirty="0"/>
               <a:t>Teacher uploads a PDF and edits a default lesson prompt.</a:t>
             </a:r>
           </a:p>
@@ -10483,7 +10754,7 @@
               <a:buAutoNum type="arabicPeriod"/>
             </a:pPr>
             <a:r>
-              <a:rPr lang="en-US" sz="2800" dirty="0"/>
+              <a:rPr lang="en-US" sz="3600" dirty="0"/>
               <a:t>AI extracts text, tables, and images.</a:t>
             </a:r>
           </a:p>
@@ -10493,7 +10764,7 @@
               <a:buAutoNum type="arabicPeriod"/>
             </a:pPr>
             <a:r>
-              <a:rPr lang="en-US" sz="2800" dirty="0"/>
+              <a:rPr lang="en-US" sz="3600" dirty="0"/>
               <a:t>Lesson is generated and previewed.</a:t>
             </a:r>
           </a:p>
@@ -10503,15 +10774,15 @@
               <a:buAutoNum type="arabicPeriod"/>
             </a:pPr>
             <a:r>
-              <a:rPr lang="en-US" sz="2800" dirty="0"/>
+              <a:rPr lang="en-US" sz="3600" dirty="0"/>
               <a:t>Teacher selects “</a:t>
             </a:r>
             <a:r>
-              <a:rPr lang="en-US" sz="2800" dirty="0" err="1"/>
+              <a:rPr lang="en-US" sz="3600" dirty="0" err="1"/>
               <a:t>Reprompt</a:t>
             </a:r>
             <a:r>
-              <a:rPr lang="en-US" sz="2800" dirty="0"/>
+              <a:rPr lang="en-US" sz="3600" dirty="0"/>
               <a:t>” or “Approve.”</a:t>
             </a:r>
           </a:p>
@@ -10521,15 +10792,9 @@
               <a:buAutoNum type="arabicPeriod"/>
             </a:pPr>
             <a:r>
-              <a:rPr lang="en-US" sz="2800" dirty="0"/>
+              <a:rPr lang="en-US" sz="3600" dirty="0"/>
               <a:t>Final version is deployed to the class website.</a:t>
             </a:r>
-          </a:p>
-          <a:p>
-            <a:endParaRPr lang="en-US" sz="3600" b="1" dirty="0">
-              <a:ea typeface="Open Sans" panose="020B0606030504020204" pitchFamily="34" charset="0"/>
-              <a:cs typeface="Open Sans" panose="020B0606030504020204" pitchFamily="34" charset="0"/>
-            </a:endParaRPr>
           </a:p>
         </p:txBody>
       </p:sp>
@@ -10548,7 +10813,7 @@
         <p:spPr>
           <a:xfrm>
             <a:off x="17243466" y="23355200"/>
-            <a:ext cx="14525194" cy="646331"/>
+            <a:ext cx="14525194" cy="830997"/>
           </a:xfrm>
           <a:prstGeom prst="rect">
             <a:avLst/>
@@ -10566,7 +10831,7 @@
           </a:lstStyle>
           <a:p>
             <a:r>
-              <a:rPr lang="en-US" sz="3600" dirty="0">
+              <a:rPr lang="en-US" sz="4800" b="1" dirty="0">
                 <a:solidFill>
                   <a:srgbClr val="235078"/>
                 </a:solidFill>
@@ -10574,6 +10839,12 @@
               </a:rPr>
               <a:t>Evaluation</a:t>
             </a:r>
+            <a:endParaRPr lang="en-US" sz="4000" b="1" dirty="0">
+              <a:solidFill>
+                <a:srgbClr val="235078"/>
+              </a:solidFill>
+              <a:latin typeface="Libre Baskerville" panose="02000000000000000000" pitchFamily="2" charset="0"/>
+            </a:endParaRPr>
           </a:p>
         </p:txBody>
       </p:sp>
@@ -10591,8 +10862,8 @@
         </p:nvSpPr>
         <p:spPr>
           <a:xfrm>
-            <a:off x="17297554" y="5625434"/>
-            <a:ext cx="14525194" cy="523220"/>
+            <a:off x="17285368" y="5858024"/>
+            <a:ext cx="14525194" cy="2923877"/>
           </a:xfrm>
           <a:prstGeom prst="rect">
             <a:avLst/>
@@ -10609,12 +10880,109 @@
             </a:defPPr>
           </a:lstStyle>
           <a:p>
-            <a:r>
-              <a:rPr lang="en-US" sz="2800" dirty="0">
-                <a:ea typeface="Open Sans" panose="020B0606030504020204" pitchFamily="34" charset="0"/>
-                <a:cs typeface="Open Sans" panose="020B0606030504020204" pitchFamily="34" charset="0"/>
+            <a:pPr marL="457200" marR="0" lvl="0" indent="-457200" algn="l" defTabSz="914400" rtl="0" eaLnBrk="0" fontAlgn="base" latinLnBrk="0" hangingPunct="0">
+              <a:lnSpc>
+                <a:spcPct val="100000"/>
+              </a:lnSpc>
+              <a:spcBef>
+                <a:spcPct val="0"/>
+              </a:spcBef>
+              <a:spcAft>
+                <a:spcPct val="0"/>
+              </a:spcAft>
+              <a:buClrTx/>
+              <a:buSzTx/>
+              <a:buFont typeface="Arial" panose="020B0604020202020204" pitchFamily="34" charset="0"/>
+              <a:buChar char="•"/>
+              <a:tabLst/>
+            </a:pPr>
+            <a:r>
+              <a:rPr kumimoji="0" lang="en-US" altLang="en-US" sz="3600" b="0" i="0" u="none" strike="noStrike" cap="none" normalizeH="0" baseline="0" dirty="0">
+                <a:ln>
+                  <a:noFill/>
+                </a:ln>
+                <a:solidFill>
+                  <a:schemeClr val="tx1"/>
+                </a:solidFill>
+                <a:effectLst/>
+                <a:latin typeface="+mj-lt"/>
               </a:rPr>
-              <a:t>BRIEF DESCRIPTION OF DATASET AND DATA SOURCE</a:t>
+              <a:t>No fixed dataset; uses teacher-uploaded materials (PDFs, articles, web links, tables) at runtime.</a:t>
+            </a:r>
+          </a:p>
+          <a:p>
+            <a:pPr marL="457200" marR="0" lvl="0" indent="-457200" algn="l" defTabSz="914400" rtl="0" eaLnBrk="0" fontAlgn="base" latinLnBrk="0" hangingPunct="0">
+              <a:lnSpc>
+                <a:spcPct val="100000"/>
+              </a:lnSpc>
+              <a:spcBef>
+                <a:spcPct val="0"/>
+              </a:spcBef>
+              <a:spcAft>
+                <a:spcPct val="0"/>
+              </a:spcAft>
+              <a:buClrTx/>
+              <a:buSzTx/>
+              <a:buFont typeface="Arial" panose="020B0604020202020204" pitchFamily="34" charset="0"/>
+              <a:buChar char="•"/>
+              <a:tabLst/>
+            </a:pPr>
+            <a:r>
+              <a:rPr kumimoji="0" lang="en-US" altLang="en-US" sz="3600" b="0" i="0" u="none" strike="noStrike" cap="none" normalizeH="0" baseline="0" dirty="0">
+                <a:ln>
+                  <a:noFill/>
+                </a:ln>
+                <a:solidFill>
+                  <a:schemeClr val="tx1"/>
+                </a:solidFill>
+                <a:effectLst/>
+                <a:latin typeface="+mj-lt"/>
+              </a:rPr>
+              <a:t>Processes inputs in real time to create personalized, structured lessons (see Pipeline below).</a:t>
+            </a:r>
+          </a:p>
+          <a:p>
+            <a:pPr marL="457200" marR="0" lvl="0" indent="-457200" algn="l" defTabSz="914400" rtl="0" eaLnBrk="0" fontAlgn="base" latinLnBrk="0" hangingPunct="0">
+              <a:lnSpc>
+                <a:spcPct val="100000"/>
+              </a:lnSpc>
+              <a:spcBef>
+                <a:spcPct val="0"/>
+              </a:spcBef>
+              <a:spcAft>
+                <a:spcPct val="0"/>
+              </a:spcAft>
+              <a:buClrTx/>
+              <a:buSzTx/>
+              <a:buFont typeface="Arial" panose="020B0604020202020204" pitchFamily="34" charset="0"/>
+              <a:buChar char="•"/>
+              <a:tabLst/>
+            </a:pPr>
+            <a:r>
+              <a:rPr kumimoji="0" lang="en-US" altLang="en-US" sz="3600" b="0" i="0" u="none" strike="noStrike" cap="none" normalizeH="0" baseline="0" dirty="0">
+                <a:ln>
+                  <a:noFill/>
+                </a:ln>
+                <a:solidFill>
+                  <a:schemeClr val="tx1"/>
+                </a:solidFill>
+                <a:effectLst/>
+                <a:latin typeface="+mj-lt"/>
+              </a:rPr>
+              <a:t>Adapts to different teaching styles without requiring extra model training</a:t>
+            </a:r>
+            <a:r>
+              <a:rPr kumimoji="0" lang="en-US" altLang="en-US" sz="4000" b="0" i="0" u="none" strike="noStrike" cap="none" normalizeH="0" baseline="0" dirty="0">
+                <a:ln>
+                  <a:noFill/>
+                </a:ln>
+                <a:solidFill>
+                  <a:schemeClr val="tx1"/>
+                </a:solidFill>
+                <a:effectLst/>
+                <a:latin typeface="+mj-lt"/>
+              </a:rPr>
+              <a:t>.</a:t>
             </a:r>
           </a:p>
         </p:txBody>
@@ -10641,8 +11009,8 @@
         </p:blipFill>
         <p:spPr>
           <a:xfrm>
-            <a:off x="18517173" y="24370099"/>
-            <a:ext cx="10793857" cy="8027431"/>
+            <a:off x="19017476" y="24370099"/>
+            <a:ext cx="9793250" cy="7283276"/>
           </a:xfrm>
           <a:prstGeom prst="rect">
             <a:avLst/>
@@ -10677,7 +11045,7 @@
         </p:nvSpPr>
         <p:spPr>
           <a:xfrm>
-            <a:off x="18517173" y="32443285"/>
+            <a:off x="18278590" y="31793789"/>
             <a:ext cx="10793857" cy="523220"/>
           </a:xfrm>
           <a:prstGeom prst="rect">
@@ -10703,6 +11071,475 @@
           </a:p>
         </p:txBody>
       </p:sp>
+      <p:sp>
+        <p:nvSpPr>
+          <p:cNvPr id="10" name="Rectangle 2">
+            <a:extLst>
+              <a:ext uri="{FF2B5EF4-FFF2-40B4-BE49-F238E27FC236}">
+                <a16:creationId xmlns:a16="http://schemas.microsoft.com/office/drawing/2014/main" id="{A6CD3A1E-594A-D564-5EC3-759A40E94C7B}"/>
+              </a:ext>
+            </a:extLst>
+          </p:cNvPr>
+          <p:cNvSpPr>
+            <a:spLocks noChangeArrowheads="1"/>
+          </p:cNvSpPr>
+          <p:nvPr/>
+        </p:nvSpPr>
+        <p:spPr bwMode="auto">
+          <a:xfrm>
+            <a:off x="0" y="-184666"/>
+            <a:ext cx="264816" cy="369332"/>
+          </a:xfrm>
+          <a:prstGeom prst="rect">
+            <a:avLst/>
+          </a:prstGeom>
+          <a:noFill/>
+          <a:ln>
+            <a:noFill/>
+          </a:ln>
+          <a:effectLst/>
+          <a:extLst>
+            <a:ext uri="{909E8E84-426E-40DD-AFC4-6F175D3DCCD1}">
+              <a14:hiddenFill xmlns:a14="http://schemas.microsoft.com/office/drawing/2010/main">
+                <a:solidFill>
+                  <a:schemeClr val="accent1"/>
+                </a:solidFill>
+              </a14:hiddenFill>
+            </a:ext>
+            <a:ext uri="{91240B29-F687-4F45-9708-019B960494DF}">
+              <a14:hiddenLine xmlns:a14="http://schemas.microsoft.com/office/drawing/2010/main" w="9525">
+                <a:solidFill>
+                  <a:schemeClr val="tx1"/>
+                </a:solidFill>
+                <a:miter lim="800000"/>
+                <a:headEnd/>
+                <a:tailEnd/>
+              </a14:hiddenLine>
+            </a:ext>
+            <a:ext uri="{AF507438-7753-43E0-B8FC-AC1667EBCBE1}">
+              <a14:hiddenEffects xmlns:a14="http://schemas.microsoft.com/office/drawing/2010/main">
+                <a:effectLst>
+                  <a:outerShdw dist="35921" dir="2700000" algn="ctr" rotWithShape="0">
+                    <a:schemeClr val="bg2"/>
+                  </a:outerShdw>
+                </a:effectLst>
+              </a14:hiddenEffects>
+            </a:ext>
+          </a:extLst>
+        </p:spPr>
+        <p:txBody>
+          <a:bodyPr vert="horz" wrap="none" lIns="91440" tIns="45720" rIns="91440" bIns="45720" numCol="1" anchor="ctr" anchorCtr="0" compatLnSpc="1">
+            <a:prstTxWarp prst="textNoShape">
+              <a:avLst/>
+            </a:prstTxWarp>
+            <a:spAutoFit/>
+          </a:bodyPr>
+          <a:lstStyle/>
+          <a:p>
+            <a:pPr marL="0" marR="0" lvl="0" indent="0" algn="l" defTabSz="914400" rtl="0" eaLnBrk="0" fontAlgn="base" latinLnBrk="0" hangingPunct="0">
+              <a:lnSpc>
+                <a:spcPct val="100000"/>
+              </a:lnSpc>
+              <a:spcBef>
+                <a:spcPct val="0"/>
+              </a:spcBef>
+              <a:spcAft>
+                <a:spcPct val="0"/>
+              </a:spcAft>
+              <a:buClrTx/>
+              <a:buSzTx/>
+              <a:buFontTx/>
+              <a:buChar char="•"/>
+              <a:tabLst/>
+            </a:pPr>
+            <a:endParaRPr kumimoji="0" lang="en-US" altLang="en-US" sz="1800" b="0" i="0" u="none" strike="noStrike" cap="none" normalizeH="0" baseline="0" dirty="0">
+              <a:ln>
+                <a:noFill/>
+              </a:ln>
+              <a:solidFill>
+                <a:schemeClr val="tx1"/>
+              </a:solidFill>
+              <a:effectLst/>
+              <a:latin typeface="Arial" panose="020B0604020202020204" pitchFamily="34" charset="0"/>
+            </a:endParaRPr>
+          </a:p>
+        </p:txBody>
+      </p:sp>
+      <p:graphicFrame>
+        <p:nvGraphicFramePr>
+          <p:cNvPr id="11" name="Table 10">
+            <a:extLst>
+              <a:ext uri="{FF2B5EF4-FFF2-40B4-BE49-F238E27FC236}">
+                <a16:creationId xmlns:a16="http://schemas.microsoft.com/office/drawing/2014/main" id="{1C0C8F34-CB81-AEB7-CE5F-4BCDCDC2160E}"/>
+              </a:ext>
+            </a:extLst>
+          </p:cNvPr>
+          <p:cNvGraphicFramePr>
+            <a:graphicFrameLocks noGrp="1"/>
+          </p:cNvGraphicFramePr>
+          <p:nvPr>
+            <p:extLst>
+              <p:ext uri="{D42A27DB-BD31-4B8C-83A1-F6EECF244321}">
+                <p14:modId xmlns:p14="http://schemas.microsoft.com/office/powerpoint/2010/main" val="403833168"/>
+              </p:ext>
+            </p:extLst>
+          </p:nvPr>
+        </p:nvGraphicFramePr>
+        <p:xfrm>
+          <a:off x="1080328" y="28399452"/>
+          <a:ext cx="14284562" cy="4432200"/>
+        </p:xfrm>
+        <a:graphic>
+          <a:graphicData uri="http://schemas.openxmlformats.org/drawingml/2006/table">
+            <a:tbl>
+              <a:tblPr firstRow="1" bandRow="1">
+                <a:tableStyleId>{ED083AE6-46FA-4A59-8FB0-9F97EB10719F}</a:tableStyleId>
+              </a:tblPr>
+              <a:tblGrid>
+                <a:gridCol w="4477681">
+                  <a:extLst>
+                    <a:ext uri="{9D8B030D-6E8A-4147-A177-3AD203B41FA5}">
+                      <a16:colId xmlns:a16="http://schemas.microsoft.com/office/drawing/2014/main" val="3360204334"/>
+                    </a:ext>
+                  </a:extLst>
+                </a:gridCol>
+                <a:gridCol w="4049991">
+                  <a:extLst>
+                    <a:ext uri="{9D8B030D-6E8A-4147-A177-3AD203B41FA5}">
+                      <a16:colId xmlns:a16="http://schemas.microsoft.com/office/drawing/2014/main" val="1072461624"/>
+                    </a:ext>
+                  </a:extLst>
+                </a:gridCol>
+                <a:gridCol w="5756890">
+                  <a:extLst>
+                    <a:ext uri="{9D8B030D-6E8A-4147-A177-3AD203B41FA5}">
+                      <a16:colId xmlns:a16="http://schemas.microsoft.com/office/drawing/2014/main" val="1950035328"/>
+                    </a:ext>
+                  </a:extLst>
+                </a:gridCol>
+              </a:tblGrid>
+              <a:tr h="652680">
+                <a:tc>
+                  <a:txBody>
+                    <a:bodyPr/>
+                    <a:lstStyle/>
+                    <a:p>
+                      <a:pPr algn="ctr"/>
+                      <a:r>
+                        <a:rPr lang="en-US" sz="3600" dirty="0">
+                          <a:solidFill>
+                            <a:schemeClr val="tx1"/>
+                          </a:solidFill>
+                        </a:rPr>
+                        <a:t>Model</a:t>
+                      </a:r>
+                    </a:p>
+                  </a:txBody>
+                  <a:tcPr anchor="ctr"/>
+                </a:tc>
+                <a:tc>
+                  <a:txBody>
+                    <a:bodyPr/>
+                    <a:lstStyle/>
+                    <a:p>
+                      <a:pPr algn="ctr"/>
+                      <a:r>
+                        <a:rPr lang="en-US" sz="3600" dirty="0"/>
+                        <a:t>Inputs</a:t>
+                      </a:r>
+                      <a:endParaRPr lang="en-US" sz="3600" dirty="0">
+                        <a:solidFill>
+                          <a:schemeClr val="accent6"/>
+                        </a:solidFill>
+                      </a:endParaRPr>
+                    </a:p>
+                  </a:txBody>
+                  <a:tcPr anchor="ctr"/>
+                </a:tc>
+                <a:tc>
+                  <a:txBody>
+                    <a:bodyPr/>
+                    <a:lstStyle/>
+                    <a:p>
+                      <a:pPr algn="ctr"/>
+                      <a:r>
+                        <a:rPr lang="en-US" sz="3600" dirty="0"/>
+                        <a:t>Notes</a:t>
+                      </a:r>
+                      <a:endParaRPr lang="en-US" sz="3600" dirty="0">
+                        <a:solidFill>
+                          <a:schemeClr val="accent6"/>
+                        </a:solidFill>
+                      </a:endParaRPr>
+                    </a:p>
+                  </a:txBody>
+                  <a:tcPr anchor="ctr"/>
+                </a:tc>
+                <a:extLst>
+                  <a:ext uri="{0D108BD9-81ED-4DB2-BD59-A6C34878D82A}">
+                    <a16:rowId xmlns:a16="http://schemas.microsoft.com/office/drawing/2014/main" val="3577713040"/>
+                  </a:ext>
+                </a:extLst>
+              </a:tr>
+              <a:tr h="529327">
+                <a:tc>
+                  <a:txBody>
+                    <a:bodyPr/>
+                    <a:lstStyle/>
+                    <a:p>
+                      <a:pPr marL="0" marR="0" lvl="0" indent="0" algn="l" defTabSz="685800" rtl="0" eaLnBrk="1" fontAlgn="auto" latinLnBrk="0" hangingPunct="1">
+                        <a:lnSpc>
+                          <a:spcPct val="100000"/>
+                        </a:lnSpc>
+                        <a:spcBef>
+                          <a:spcPts val="0"/>
+                        </a:spcBef>
+                        <a:spcAft>
+                          <a:spcPts val="0"/>
+                        </a:spcAft>
+                        <a:buClrTx/>
+                        <a:buSzTx/>
+                        <a:buFontTx/>
+                        <a:buNone/>
+                        <a:tabLst/>
+                        <a:defRPr/>
+                      </a:pPr>
+                      <a:r>
+                        <a:rPr lang="en-US" sz="3200" dirty="0"/>
+                        <a:t>Llama-2-7b-chat-hf </a:t>
+                      </a:r>
+                    </a:p>
+                    <a:p>
+                      <a:pPr marL="0" marR="0" lvl="0" indent="0" algn="l" defTabSz="685800" rtl="0" eaLnBrk="1" fontAlgn="auto" latinLnBrk="0" hangingPunct="1">
+                        <a:lnSpc>
+                          <a:spcPct val="100000"/>
+                        </a:lnSpc>
+                        <a:spcBef>
+                          <a:spcPts val="0"/>
+                        </a:spcBef>
+                        <a:spcAft>
+                          <a:spcPts val="0"/>
+                        </a:spcAft>
+                        <a:buClrTx/>
+                        <a:buSzTx/>
+                        <a:buFontTx/>
+                        <a:buNone/>
+                        <a:tabLst/>
+                        <a:defRPr/>
+                      </a:pPr>
+                      <a:r>
+                        <a:rPr lang="en-US" sz="3200" dirty="0"/>
+                        <a:t>(Chosen Model) ✅</a:t>
+                      </a:r>
+                    </a:p>
+                  </a:txBody>
+                  <a:tcPr/>
+                </a:tc>
+                <a:tc>
+                  <a:txBody>
+                    <a:bodyPr/>
+                    <a:lstStyle/>
+                    <a:p>
+                      <a:pPr algn="ctr"/>
+                      <a:r>
+                        <a:rPr lang="en-US" sz="3200" dirty="0"/>
+                        <a:t>Text, Tables</a:t>
+                      </a:r>
+                    </a:p>
+                  </a:txBody>
+                  <a:tcPr anchor="ctr"/>
+                </a:tc>
+                <a:tc>
+                  <a:txBody>
+                    <a:bodyPr/>
+                    <a:lstStyle/>
+                    <a:p>
+                      <a:pPr algn="ctr"/>
+                      <a:r>
+                        <a:rPr lang="en-US" sz="3200" dirty="0"/>
+                        <a:t>Excels at summarizing text; does not accept images</a:t>
+                      </a:r>
+                    </a:p>
+                  </a:txBody>
+                  <a:tcPr anchor="ctr"/>
+                </a:tc>
+                <a:extLst>
+                  <a:ext uri="{0D108BD9-81ED-4DB2-BD59-A6C34878D82A}">
+                    <a16:rowId xmlns:a16="http://schemas.microsoft.com/office/drawing/2014/main" val="992397869"/>
+                  </a:ext>
+                </a:extLst>
+              </a:tr>
+              <a:tr h="529327">
+                <a:tc>
+                  <a:txBody>
+                    <a:bodyPr/>
+                    <a:lstStyle/>
+                    <a:p>
+                      <a:r>
+                        <a:rPr lang="en-US" sz="3200" dirty="0" err="1"/>
+                        <a:t>LLaVA</a:t>
+                      </a:r>
+                      <a:r>
+                        <a:rPr lang="en-US" sz="3200" dirty="0"/>
+                        <a:t> 1.5 ❌</a:t>
+                      </a:r>
+                      <a:endParaRPr lang="en-US" sz="3200" dirty="0">
+                        <a:solidFill>
+                          <a:schemeClr val="tx1"/>
+                        </a:solidFill>
+                      </a:endParaRPr>
+                    </a:p>
+                  </a:txBody>
+                  <a:tcPr/>
+                </a:tc>
+                <a:tc>
+                  <a:txBody>
+                    <a:bodyPr/>
+                    <a:lstStyle/>
+                    <a:p>
+                      <a:pPr algn="ctr"/>
+                      <a:r>
+                        <a:rPr lang="en-US" sz="3200" dirty="0"/>
+                        <a:t>Images, Text, Tables</a:t>
+                      </a:r>
+                    </a:p>
+                  </a:txBody>
+                  <a:tcPr anchor="ctr"/>
+                </a:tc>
+                <a:tc>
+                  <a:txBody>
+                    <a:bodyPr/>
+                    <a:lstStyle/>
+                    <a:p>
+                      <a:pPr algn="ctr"/>
+                      <a:r>
+                        <a:rPr lang="en-US" sz="3200" dirty="0"/>
+                        <a:t>Poor at summarizing text</a:t>
+                      </a:r>
+                    </a:p>
+                  </a:txBody>
+                  <a:tcPr anchor="ctr"/>
+                </a:tc>
+                <a:extLst>
+                  <a:ext uri="{0D108BD9-81ED-4DB2-BD59-A6C34878D82A}">
+                    <a16:rowId xmlns:a16="http://schemas.microsoft.com/office/drawing/2014/main" val="315132374"/>
+                  </a:ext>
+                </a:extLst>
+              </a:tr>
+              <a:tr h="529327">
+                <a:tc>
+                  <a:txBody>
+                    <a:bodyPr/>
+                    <a:lstStyle/>
+                    <a:p>
+                      <a:r>
+                        <a:rPr lang="en-US" sz="3200" dirty="0" err="1"/>
+                        <a:t>LLaVA</a:t>
+                      </a:r>
+                      <a:r>
+                        <a:rPr lang="en-US" sz="3200" dirty="0"/>
+                        <a:t> 1.6 ❌</a:t>
+                      </a:r>
+                      <a:endParaRPr lang="en-US" sz="3200" dirty="0">
+                        <a:solidFill>
+                          <a:schemeClr val="tx1"/>
+                        </a:solidFill>
+                      </a:endParaRPr>
+                    </a:p>
+                  </a:txBody>
+                  <a:tcPr/>
+                </a:tc>
+                <a:tc>
+                  <a:txBody>
+                    <a:bodyPr/>
+                    <a:lstStyle/>
+                    <a:p>
+                      <a:pPr algn="ctr"/>
+                      <a:r>
+                        <a:rPr lang="en-US" sz="3200" dirty="0"/>
+                        <a:t>Images, Text, Tables</a:t>
+                      </a:r>
+                    </a:p>
+                  </a:txBody>
+                  <a:tcPr anchor="ctr"/>
+                </a:tc>
+                <a:tc>
+                  <a:txBody>
+                    <a:bodyPr/>
+                    <a:lstStyle/>
+                    <a:p>
+                      <a:pPr algn="ctr"/>
+                      <a:r>
+                        <a:rPr lang="en-US" sz="3200" dirty="0"/>
+                        <a:t>Cannot be configured on Magic-02</a:t>
+                      </a:r>
+                    </a:p>
+                  </a:txBody>
+                  <a:tcPr anchor="ctr"/>
+                </a:tc>
+                <a:extLst>
+                  <a:ext uri="{0D108BD9-81ED-4DB2-BD59-A6C34878D82A}">
+                    <a16:rowId xmlns:a16="http://schemas.microsoft.com/office/drawing/2014/main" val="4105278027"/>
+                  </a:ext>
+                </a:extLst>
+              </a:tr>
+              <a:tr h="529327">
+                <a:tc>
+                  <a:txBody>
+                    <a:bodyPr/>
+                    <a:lstStyle/>
+                    <a:p>
+                      <a:r>
+                        <a:rPr lang="en-US" sz="3200" dirty="0"/>
+                        <a:t>OpenAI GPT-4o ❌</a:t>
+                      </a:r>
+                      <a:endParaRPr lang="en-US" sz="3200" dirty="0">
+                        <a:solidFill>
+                          <a:schemeClr val="tx1"/>
+                        </a:solidFill>
+                      </a:endParaRPr>
+                    </a:p>
+                  </a:txBody>
+                  <a:tcPr/>
+                </a:tc>
+                <a:tc>
+                  <a:txBody>
+                    <a:bodyPr/>
+                    <a:lstStyle/>
+                    <a:p>
+                      <a:pPr algn="ctr"/>
+                      <a:r>
+                        <a:rPr lang="en-US" sz="3200" dirty="0"/>
+                        <a:t>Images, Text, Tables</a:t>
+                      </a:r>
+                    </a:p>
+                  </a:txBody>
+                  <a:tcPr anchor="ctr"/>
+                </a:tc>
+                <a:tc>
+                  <a:txBody>
+                    <a:bodyPr/>
+                    <a:lstStyle/>
+                    <a:p>
+                      <a:pPr algn="ctr"/>
+                      <a:r>
+                        <a:rPr lang="en-US" sz="3200" dirty="0"/>
+                        <a:t>Requires paid subscription for unlimited access</a:t>
+                      </a:r>
+                    </a:p>
+                  </a:txBody>
+                  <a:tcPr anchor="ctr"/>
+                </a:tc>
+                <a:extLst>
+                  <a:ext uri="{0D108BD9-81ED-4DB2-BD59-A6C34878D82A}">
+                    <a16:rowId xmlns:a16="http://schemas.microsoft.com/office/drawing/2014/main" val="3916235558"/>
+                  </a:ext>
+                </a:extLst>
+              </a:tr>
+            </a:tbl>
+          </a:graphicData>
+        </a:graphic>
+      </p:graphicFrame>
     </p:spTree>
   </p:cSld>
   <p:clrMapOvr>

</xml_diff>